<commit_message>
Lesson 3 (part 3)
Add fx:id from fxml file
Correction of presentation
</commit_message>
<xml_diff>
--- a/lesson3/Lesson3.pptx
+++ b/lesson3/Lesson3.pptx
@@ -23,6 +23,7 @@
     <p:sldId id="282" r:id="rId17"/>
     <p:sldId id="283" r:id="rId18"/>
     <p:sldId id="284" r:id="rId19"/>
+    <p:sldId id="285" r:id="rId20"/>
   </p:sldIdLst>
   <p:sldSz cx="12192000" cy="6858000"/>
   <p:notesSz cx="6858000" cy="9144000"/>
@@ -4366,7 +4367,7 @@
           <a:p>
             <a:fld id="{E86568AC-7B28-4CD1-8C90-85ABC9888AE3}" type="datetimeFigureOut">
               <a:rPr lang="uk-UA" smtClean="0"/>
-              <a:t>18.04.2025</a:t>
+              <a:t>28.04.2025</a:t>
             </a:fld>
             <a:endParaRPr lang="uk-UA"/>
           </a:p>
@@ -4566,7 +4567,7 @@
           <a:p>
             <a:fld id="{E86568AC-7B28-4CD1-8C90-85ABC9888AE3}" type="datetimeFigureOut">
               <a:rPr lang="uk-UA" smtClean="0"/>
-              <a:t>18.04.2025</a:t>
+              <a:t>28.04.2025</a:t>
             </a:fld>
             <a:endParaRPr lang="uk-UA"/>
           </a:p>
@@ -4776,7 +4777,7 @@
           <a:p>
             <a:fld id="{E86568AC-7B28-4CD1-8C90-85ABC9888AE3}" type="datetimeFigureOut">
               <a:rPr lang="uk-UA" smtClean="0"/>
-              <a:t>18.04.2025</a:t>
+              <a:t>28.04.2025</a:t>
             </a:fld>
             <a:endParaRPr lang="uk-UA"/>
           </a:p>
@@ -4976,7 +4977,7 @@
           <a:p>
             <a:fld id="{E86568AC-7B28-4CD1-8C90-85ABC9888AE3}" type="datetimeFigureOut">
               <a:rPr lang="uk-UA" smtClean="0"/>
-              <a:t>18.04.2025</a:t>
+              <a:t>28.04.2025</a:t>
             </a:fld>
             <a:endParaRPr lang="uk-UA"/>
           </a:p>
@@ -5252,7 +5253,7 @@
           <a:p>
             <a:fld id="{E86568AC-7B28-4CD1-8C90-85ABC9888AE3}" type="datetimeFigureOut">
               <a:rPr lang="uk-UA" smtClean="0"/>
-              <a:t>18.04.2025</a:t>
+              <a:t>28.04.2025</a:t>
             </a:fld>
             <a:endParaRPr lang="uk-UA"/>
           </a:p>
@@ -5520,7 +5521,7 @@
           <a:p>
             <a:fld id="{E86568AC-7B28-4CD1-8C90-85ABC9888AE3}" type="datetimeFigureOut">
               <a:rPr lang="uk-UA" smtClean="0"/>
-              <a:t>18.04.2025</a:t>
+              <a:t>28.04.2025</a:t>
             </a:fld>
             <a:endParaRPr lang="uk-UA"/>
           </a:p>
@@ -5935,7 +5936,7 @@
           <a:p>
             <a:fld id="{E86568AC-7B28-4CD1-8C90-85ABC9888AE3}" type="datetimeFigureOut">
               <a:rPr lang="uk-UA" smtClean="0"/>
-              <a:t>18.04.2025</a:t>
+              <a:t>28.04.2025</a:t>
             </a:fld>
             <a:endParaRPr lang="uk-UA"/>
           </a:p>
@@ -6077,7 +6078,7 @@
           <a:p>
             <a:fld id="{E86568AC-7B28-4CD1-8C90-85ABC9888AE3}" type="datetimeFigureOut">
               <a:rPr lang="uk-UA" smtClean="0"/>
-              <a:t>18.04.2025</a:t>
+              <a:t>28.04.2025</a:t>
             </a:fld>
             <a:endParaRPr lang="uk-UA"/>
           </a:p>
@@ -6190,7 +6191,7 @@
           <a:p>
             <a:fld id="{E86568AC-7B28-4CD1-8C90-85ABC9888AE3}" type="datetimeFigureOut">
               <a:rPr lang="uk-UA" smtClean="0"/>
-              <a:t>18.04.2025</a:t>
+              <a:t>28.04.2025</a:t>
             </a:fld>
             <a:endParaRPr lang="uk-UA"/>
           </a:p>
@@ -6503,7 +6504,7 @@
           <a:p>
             <a:fld id="{E86568AC-7B28-4CD1-8C90-85ABC9888AE3}" type="datetimeFigureOut">
               <a:rPr lang="uk-UA" smtClean="0"/>
-              <a:t>18.04.2025</a:t>
+              <a:t>28.04.2025</a:t>
             </a:fld>
             <a:endParaRPr lang="uk-UA"/>
           </a:p>
@@ -6792,7 +6793,7 @@
           <a:p>
             <a:fld id="{E86568AC-7B28-4CD1-8C90-85ABC9888AE3}" type="datetimeFigureOut">
               <a:rPr lang="uk-UA" smtClean="0"/>
-              <a:t>18.04.2025</a:t>
+              <a:t>28.04.2025</a:t>
             </a:fld>
             <a:endParaRPr lang="uk-UA"/>
           </a:p>
@@ -7035,7 +7036,7 @@
           <a:p>
             <a:fld id="{E86568AC-7B28-4CD1-8C90-85ABC9888AE3}" type="datetimeFigureOut">
               <a:rPr lang="uk-UA" smtClean="0"/>
-              <a:t>18.04.2025</a:t>
+              <a:t>28.04.2025</a:t>
             </a:fld>
             <a:endParaRPr lang="uk-UA"/>
           </a:p>
@@ -8098,8 +8099,8 @@
             <a:chExt cx="1423800" cy="973192"/>
           </a:xfrm>
         </p:grpSpPr>
-        <mc:AlternateContent xmlns:mc="http://schemas.openxmlformats.org/markup-compatibility/2006">
-          <mc:Choice xmlns:p14="http://schemas.microsoft.com/office/powerpoint/2010/main" Requires="p14">
+        <mc:AlternateContent xmlns:mc="http://schemas.openxmlformats.org/markup-compatibility/2006" xmlns:p14="http://schemas.microsoft.com/office/powerpoint/2010/main">
+          <mc:Choice Requires="p14">
             <p:contentPart p14:bwMode="auto" r:id="rId5">
               <p14:nvContentPartPr>
                 <p14:cNvPr id="18" name="Ink 17">
@@ -8118,7 +8119,7 @@
               </p14:xfrm>
             </p:contentPart>
           </mc:Choice>
-          <mc:Fallback>
+          <mc:Fallback xmlns="">
             <p:pic>
               <p:nvPicPr>
                 <p:cNvPr id="18" name="Ink 17">
@@ -8149,8 +8150,8 @@
             </p:pic>
           </mc:Fallback>
         </mc:AlternateContent>
-        <mc:AlternateContent xmlns:mc="http://schemas.openxmlformats.org/markup-compatibility/2006">
-          <mc:Choice xmlns:p14="http://schemas.microsoft.com/office/powerpoint/2010/main" Requires="p14">
+        <mc:AlternateContent xmlns:mc="http://schemas.openxmlformats.org/markup-compatibility/2006" xmlns:p14="http://schemas.microsoft.com/office/powerpoint/2010/main">
+          <mc:Choice Requires="p14">
             <p:contentPart p14:bwMode="auto" r:id="rId7">
               <p14:nvContentPartPr>
                 <p14:cNvPr id="19" name="Ink 18">
@@ -8169,7 +8170,7 @@
               </p14:xfrm>
             </p:contentPart>
           </mc:Choice>
-          <mc:Fallback>
+          <mc:Fallback xmlns="">
             <p:pic>
               <p:nvPicPr>
                 <p:cNvPr id="19" name="Ink 18">
@@ -8200,8 +8201,8 @@
             </p:pic>
           </mc:Fallback>
         </mc:AlternateContent>
-        <mc:AlternateContent xmlns:mc="http://schemas.openxmlformats.org/markup-compatibility/2006">
-          <mc:Choice xmlns:p14="http://schemas.microsoft.com/office/powerpoint/2010/main" Requires="p14">
+        <mc:AlternateContent xmlns:mc="http://schemas.openxmlformats.org/markup-compatibility/2006" xmlns:p14="http://schemas.microsoft.com/office/powerpoint/2010/main">
+          <mc:Choice Requires="p14">
             <p:contentPart p14:bwMode="auto" r:id="rId9">
               <p14:nvContentPartPr>
                 <p14:cNvPr id="21" name="Ink 20">
@@ -8220,7 +8221,7 @@
               </p14:xfrm>
             </p:contentPart>
           </mc:Choice>
-          <mc:Fallback>
+          <mc:Fallback xmlns="">
             <p:pic>
               <p:nvPicPr>
                 <p:cNvPr id="21" name="Ink 20">
@@ -8251,8 +8252,8 @@
             </p:pic>
           </mc:Fallback>
         </mc:AlternateContent>
-        <mc:AlternateContent xmlns:mc="http://schemas.openxmlformats.org/markup-compatibility/2006">
-          <mc:Choice xmlns:p14="http://schemas.microsoft.com/office/powerpoint/2010/main" Requires="p14">
+        <mc:AlternateContent xmlns:mc="http://schemas.openxmlformats.org/markup-compatibility/2006" xmlns:p14="http://schemas.microsoft.com/office/powerpoint/2010/main">
+          <mc:Choice Requires="p14">
             <p:contentPart p14:bwMode="auto" r:id="rId11">
               <p14:nvContentPartPr>
                 <p14:cNvPr id="22" name="Ink 21">
@@ -8271,7 +8272,7 @@
               </p14:xfrm>
             </p:contentPart>
           </mc:Choice>
-          <mc:Fallback>
+          <mc:Fallback xmlns="">
             <p:pic>
               <p:nvPicPr>
                 <p:cNvPr id="22" name="Ink 21">
@@ -8302,8 +8303,8 @@
             </p:pic>
           </mc:Fallback>
         </mc:AlternateContent>
-        <mc:AlternateContent xmlns:mc="http://schemas.openxmlformats.org/markup-compatibility/2006">
-          <mc:Choice xmlns:p14="http://schemas.microsoft.com/office/powerpoint/2010/main" Requires="p14">
+        <mc:AlternateContent xmlns:mc="http://schemas.openxmlformats.org/markup-compatibility/2006" xmlns:p14="http://schemas.microsoft.com/office/powerpoint/2010/main">
+          <mc:Choice Requires="p14">
             <p:contentPart p14:bwMode="auto" r:id="rId13">
               <p14:nvContentPartPr>
                 <p14:cNvPr id="23" name="Ink 22">
@@ -8322,7 +8323,7 @@
               </p14:xfrm>
             </p:contentPart>
           </mc:Choice>
-          <mc:Fallback>
+          <mc:Fallback xmlns="">
             <p:pic>
               <p:nvPicPr>
                 <p:cNvPr id="23" name="Ink 22">
@@ -8353,8 +8354,8 @@
             </p:pic>
           </mc:Fallback>
         </mc:AlternateContent>
-        <mc:AlternateContent xmlns:mc="http://schemas.openxmlformats.org/markup-compatibility/2006">
-          <mc:Choice xmlns:p14="http://schemas.microsoft.com/office/powerpoint/2010/main" Requires="p14">
+        <mc:AlternateContent xmlns:mc="http://schemas.openxmlformats.org/markup-compatibility/2006" xmlns:p14="http://schemas.microsoft.com/office/powerpoint/2010/main">
+          <mc:Choice Requires="p14">
             <p:contentPart p14:bwMode="auto" r:id="rId15">
               <p14:nvContentPartPr>
                 <p14:cNvPr id="25" name="Ink 24">
@@ -8373,7 +8374,7 @@
               </p14:xfrm>
             </p:contentPart>
           </mc:Choice>
-          <mc:Fallback>
+          <mc:Fallback xmlns="">
             <p:pic>
               <p:nvPicPr>
                 <p:cNvPr id="25" name="Ink 24">
@@ -8404,8 +8405,8 @@
             </p:pic>
           </mc:Fallback>
         </mc:AlternateContent>
-        <mc:AlternateContent xmlns:mc="http://schemas.openxmlformats.org/markup-compatibility/2006">
-          <mc:Choice xmlns:p14="http://schemas.microsoft.com/office/powerpoint/2010/main" Requires="p14">
+        <mc:AlternateContent xmlns:mc="http://schemas.openxmlformats.org/markup-compatibility/2006" xmlns:p14="http://schemas.microsoft.com/office/powerpoint/2010/main">
+          <mc:Choice Requires="p14">
             <p:contentPart p14:bwMode="auto" r:id="rId17">
               <p14:nvContentPartPr>
                 <p14:cNvPr id="26" name="Ink 25">
@@ -8424,7 +8425,7 @@
               </p14:xfrm>
             </p:contentPart>
           </mc:Choice>
-          <mc:Fallback>
+          <mc:Fallback xmlns="">
             <p:pic>
               <p:nvPicPr>
                 <p:cNvPr id="26" name="Ink 25">
@@ -8455,8 +8456,8 @@
             </p:pic>
           </mc:Fallback>
         </mc:AlternateContent>
-        <mc:AlternateContent xmlns:mc="http://schemas.openxmlformats.org/markup-compatibility/2006">
-          <mc:Choice xmlns:p14="http://schemas.microsoft.com/office/powerpoint/2010/main" Requires="p14">
+        <mc:AlternateContent xmlns:mc="http://schemas.openxmlformats.org/markup-compatibility/2006" xmlns:p14="http://schemas.microsoft.com/office/powerpoint/2010/main">
+          <mc:Choice Requires="p14">
             <p:contentPart p14:bwMode="auto" r:id="rId19">
               <p14:nvContentPartPr>
                 <p14:cNvPr id="42" name="Ink 41">
@@ -8475,7 +8476,7 @@
               </p14:xfrm>
             </p:contentPart>
           </mc:Choice>
-          <mc:Fallback>
+          <mc:Fallback xmlns="">
             <p:pic>
               <p:nvPicPr>
                 <p:cNvPr id="42" name="Ink 41">
@@ -8506,8 +8507,8 @@
             </p:pic>
           </mc:Fallback>
         </mc:AlternateContent>
-        <mc:AlternateContent xmlns:mc="http://schemas.openxmlformats.org/markup-compatibility/2006">
-          <mc:Choice xmlns:p14="http://schemas.microsoft.com/office/powerpoint/2010/main" Requires="p14">
+        <mc:AlternateContent xmlns:mc="http://schemas.openxmlformats.org/markup-compatibility/2006" xmlns:p14="http://schemas.microsoft.com/office/powerpoint/2010/main">
+          <mc:Choice Requires="p14">
             <p:contentPart p14:bwMode="auto" r:id="rId21">
               <p14:nvContentPartPr>
                 <p14:cNvPr id="43" name="Ink 42">
@@ -8526,7 +8527,7 @@
               </p14:xfrm>
             </p:contentPart>
           </mc:Choice>
-          <mc:Fallback>
+          <mc:Fallback xmlns="">
             <p:pic>
               <p:nvPicPr>
                 <p:cNvPr id="43" name="Ink 42">
@@ -8557,8 +8558,8 @@
             </p:pic>
           </mc:Fallback>
         </mc:AlternateContent>
-        <mc:AlternateContent xmlns:mc="http://schemas.openxmlformats.org/markup-compatibility/2006">
-          <mc:Choice xmlns:p14="http://schemas.microsoft.com/office/powerpoint/2010/main" Requires="p14">
+        <mc:AlternateContent xmlns:mc="http://schemas.openxmlformats.org/markup-compatibility/2006" xmlns:p14="http://schemas.microsoft.com/office/powerpoint/2010/main">
+          <mc:Choice Requires="p14">
             <p:contentPart p14:bwMode="auto" r:id="rId23">
               <p14:nvContentPartPr>
                 <p14:cNvPr id="44" name="Ink 43">
@@ -8577,7 +8578,7 @@
               </p14:xfrm>
             </p:contentPart>
           </mc:Choice>
-          <mc:Fallback>
+          <mc:Fallback xmlns="">
             <p:pic>
               <p:nvPicPr>
                 <p:cNvPr id="44" name="Ink 43">
@@ -8608,8 +8609,8 @@
             </p:pic>
           </mc:Fallback>
         </mc:AlternateContent>
-        <mc:AlternateContent xmlns:mc="http://schemas.openxmlformats.org/markup-compatibility/2006">
-          <mc:Choice xmlns:p14="http://schemas.microsoft.com/office/powerpoint/2010/main" Requires="p14">
+        <mc:AlternateContent xmlns:mc="http://schemas.openxmlformats.org/markup-compatibility/2006" xmlns:p14="http://schemas.microsoft.com/office/powerpoint/2010/main">
+          <mc:Choice Requires="p14">
             <p:contentPart p14:bwMode="auto" r:id="rId25">
               <p14:nvContentPartPr>
                 <p14:cNvPr id="45" name="Ink 44">
@@ -8628,7 +8629,7 @@
               </p14:xfrm>
             </p:contentPart>
           </mc:Choice>
-          <mc:Fallback>
+          <mc:Fallback xmlns="">
             <p:pic>
               <p:nvPicPr>
                 <p:cNvPr id="45" name="Ink 44">
@@ -8659,8 +8660,8 @@
             </p:pic>
           </mc:Fallback>
         </mc:AlternateContent>
-        <mc:AlternateContent xmlns:mc="http://schemas.openxmlformats.org/markup-compatibility/2006">
-          <mc:Choice xmlns:p14="http://schemas.microsoft.com/office/powerpoint/2010/main" Requires="p14">
+        <mc:AlternateContent xmlns:mc="http://schemas.openxmlformats.org/markup-compatibility/2006" xmlns:p14="http://schemas.microsoft.com/office/powerpoint/2010/main">
+          <mc:Choice Requires="p14">
             <p:contentPart p14:bwMode="auto" r:id="rId27">
               <p14:nvContentPartPr>
                 <p14:cNvPr id="46" name="Ink 45">
@@ -8679,7 +8680,7 @@
               </p14:xfrm>
             </p:contentPart>
           </mc:Choice>
-          <mc:Fallback>
+          <mc:Fallback xmlns="">
             <p:pic>
               <p:nvPicPr>
                 <p:cNvPr id="46" name="Ink 45">
@@ -8710,8 +8711,8 @@
             </p:pic>
           </mc:Fallback>
         </mc:AlternateContent>
-        <mc:AlternateContent xmlns:mc="http://schemas.openxmlformats.org/markup-compatibility/2006">
-          <mc:Choice xmlns:p14="http://schemas.microsoft.com/office/powerpoint/2010/main" Requires="p14">
+        <mc:AlternateContent xmlns:mc="http://schemas.openxmlformats.org/markup-compatibility/2006" xmlns:p14="http://schemas.microsoft.com/office/powerpoint/2010/main">
+          <mc:Choice Requires="p14">
             <p:contentPart p14:bwMode="auto" r:id="rId29">
               <p14:nvContentPartPr>
                 <p14:cNvPr id="47" name="Ink 46">
@@ -8730,7 +8731,7 @@
               </p14:xfrm>
             </p:contentPart>
           </mc:Choice>
-          <mc:Fallback>
+          <mc:Fallback xmlns="">
             <p:pic>
               <p:nvPicPr>
                 <p:cNvPr id="47" name="Ink 46">
@@ -8761,8 +8762,8 @@
             </p:pic>
           </mc:Fallback>
         </mc:AlternateContent>
-        <mc:AlternateContent xmlns:mc="http://schemas.openxmlformats.org/markup-compatibility/2006">
-          <mc:Choice xmlns:p14="http://schemas.microsoft.com/office/powerpoint/2010/main" Requires="p14">
+        <mc:AlternateContent xmlns:mc="http://schemas.openxmlformats.org/markup-compatibility/2006" xmlns:p14="http://schemas.microsoft.com/office/powerpoint/2010/main">
+          <mc:Choice Requires="p14">
             <p:contentPart p14:bwMode="auto" r:id="rId31">
               <p14:nvContentPartPr>
                 <p14:cNvPr id="48" name="Ink 47">
@@ -8781,7 +8782,7 @@
               </p14:xfrm>
             </p:contentPart>
           </mc:Choice>
-          <mc:Fallback>
+          <mc:Fallback xmlns="">
             <p:pic>
               <p:nvPicPr>
                 <p:cNvPr id="48" name="Ink 47">
@@ -8812,8 +8813,8 @@
             </p:pic>
           </mc:Fallback>
         </mc:AlternateContent>
-        <mc:AlternateContent xmlns:mc="http://schemas.openxmlformats.org/markup-compatibility/2006">
-          <mc:Choice xmlns:p14="http://schemas.microsoft.com/office/powerpoint/2010/main" Requires="p14">
+        <mc:AlternateContent xmlns:mc="http://schemas.openxmlformats.org/markup-compatibility/2006" xmlns:p14="http://schemas.microsoft.com/office/powerpoint/2010/main">
+          <mc:Choice Requires="p14">
             <p:contentPart p14:bwMode="auto" r:id="rId33">
               <p14:nvContentPartPr>
                 <p14:cNvPr id="49" name="Ink 48">
@@ -8832,7 +8833,7 @@
               </p14:xfrm>
             </p:contentPart>
           </mc:Choice>
-          <mc:Fallback>
+          <mc:Fallback xmlns="">
             <p:pic>
               <p:nvPicPr>
                 <p:cNvPr id="49" name="Ink 48">
@@ -8863,8 +8864,8 @@
             </p:pic>
           </mc:Fallback>
         </mc:AlternateContent>
-        <mc:AlternateContent xmlns:mc="http://schemas.openxmlformats.org/markup-compatibility/2006">
-          <mc:Choice xmlns:p14="http://schemas.microsoft.com/office/powerpoint/2010/main" Requires="p14">
+        <mc:AlternateContent xmlns:mc="http://schemas.openxmlformats.org/markup-compatibility/2006" xmlns:p14="http://schemas.microsoft.com/office/powerpoint/2010/main">
+          <mc:Choice Requires="p14">
             <p:contentPart p14:bwMode="auto" r:id="rId35">
               <p14:nvContentPartPr>
                 <p14:cNvPr id="50" name="Ink 49">
@@ -8883,7 +8884,7 @@
               </p14:xfrm>
             </p:contentPart>
           </mc:Choice>
-          <mc:Fallback>
+          <mc:Fallback xmlns="">
             <p:pic>
               <p:nvPicPr>
                 <p:cNvPr id="50" name="Ink 49">
@@ -8914,8 +8915,8 @@
             </p:pic>
           </mc:Fallback>
         </mc:AlternateContent>
-        <mc:AlternateContent xmlns:mc="http://schemas.openxmlformats.org/markup-compatibility/2006">
-          <mc:Choice xmlns:p14="http://schemas.microsoft.com/office/powerpoint/2010/main" Requires="p14">
+        <mc:AlternateContent xmlns:mc="http://schemas.openxmlformats.org/markup-compatibility/2006" xmlns:p14="http://schemas.microsoft.com/office/powerpoint/2010/main">
+          <mc:Choice Requires="p14">
             <p:contentPart p14:bwMode="auto" r:id="rId37">
               <p14:nvContentPartPr>
                 <p14:cNvPr id="51" name="Ink 50">
@@ -8934,7 +8935,7 @@
               </p14:xfrm>
             </p:contentPart>
           </mc:Choice>
-          <mc:Fallback>
+          <mc:Fallback xmlns="">
             <p:pic>
               <p:nvPicPr>
                 <p:cNvPr id="51" name="Ink 50">
@@ -9296,8 +9297,8 @@
             <a:chExt cx="1581840" cy="964800"/>
           </a:xfrm>
         </p:grpSpPr>
-        <mc:AlternateContent xmlns:mc="http://schemas.openxmlformats.org/markup-compatibility/2006">
-          <mc:Choice xmlns:p14="http://schemas.microsoft.com/office/powerpoint/2010/main" Requires="p14">
+        <mc:AlternateContent xmlns:mc="http://schemas.openxmlformats.org/markup-compatibility/2006" xmlns:p14="http://schemas.microsoft.com/office/powerpoint/2010/main">
+          <mc:Choice Requires="p14">
             <p:contentPart p14:bwMode="auto" r:id="rId4">
               <p14:nvContentPartPr>
                 <p14:cNvPr id="10" name="Ink 9">
@@ -9316,7 +9317,7 @@
               </p14:xfrm>
             </p:contentPart>
           </mc:Choice>
-          <mc:Fallback>
+          <mc:Fallback xmlns="">
             <p:pic>
               <p:nvPicPr>
                 <p:cNvPr id="10" name="Ink 9">
@@ -9347,8 +9348,8 @@
             </p:pic>
           </mc:Fallback>
         </mc:AlternateContent>
-        <mc:AlternateContent xmlns:mc="http://schemas.openxmlformats.org/markup-compatibility/2006">
-          <mc:Choice xmlns:p14="http://schemas.microsoft.com/office/powerpoint/2010/main" Requires="p14">
+        <mc:AlternateContent xmlns:mc="http://schemas.openxmlformats.org/markup-compatibility/2006" xmlns:p14="http://schemas.microsoft.com/office/powerpoint/2010/main">
+          <mc:Choice Requires="p14">
             <p:contentPart p14:bwMode="auto" r:id="rId6">
               <p14:nvContentPartPr>
                 <p14:cNvPr id="11" name="Ink 10">
@@ -9367,7 +9368,7 @@
               </p14:xfrm>
             </p:contentPart>
           </mc:Choice>
-          <mc:Fallback>
+          <mc:Fallback xmlns="">
             <p:pic>
               <p:nvPicPr>
                 <p:cNvPr id="11" name="Ink 10">
@@ -9545,8 +9546,8 @@
             </a:prstGeom>
           </p:spPr>
         </p:pic>
-        <mc:AlternateContent xmlns:mc="http://schemas.openxmlformats.org/markup-compatibility/2006">
-          <mc:Choice xmlns:p14="http://schemas.microsoft.com/office/powerpoint/2010/main" Requires="p14">
+        <mc:AlternateContent xmlns:mc="http://schemas.openxmlformats.org/markup-compatibility/2006" xmlns:p14="http://schemas.microsoft.com/office/powerpoint/2010/main">
+          <mc:Choice Requires="p14">
             <p:contentPart p14:bwMode="auto" r:id="rId3">
               <p14:nvContentPartPr>
                 <p14:cNvPr id="32" name="Ink 31">
@@ -9565,7 +9566,7 @@
               </p14:xfrm>
             </p:contentPart>
           </mc:Choice>
-          <mc:Fallback>
+          <mc:Fallback xmlns="">
             <p:pic>
               <p:nvPicPr>
                 <p:cNvPr id="32" name="Ink 31">
@@ -9772,8 +9773,8 @@
           </a:prstGeom>
         </p:spPr>
       </p:pic>
-      <mc:AlternateContent xmlns:mc="http://schemas.openxmlformats.org/markup-compatibility/2006">
-        <mc:Choice xmlns:p14="http://schemas.microsoft.com/office/powerpoint/2010/main" Requires="p14">
+      <mc:AlternateContent xmlns:mc="http://schemas.openxmlformats.org/markup-compatibility/2006" xmlns:p14="http://schemas.microsoft.com/office/powerpoint/2010/main">
+        <mc:Choice Requires="p14">
           <p:contentPart p14:bwMode="auto" r:id="rId9">
             <p14:nvContentPartPr>
               <p14:cNvPr id="28" name="Ink 27">
@@ -9792,7 +9793,7 @@
             </p14:xfrm>
           </p:contentPart>
         </mc:Choice>
-        <mc:Fallback>
+        <mc:Fallback xmlns="">
           <p:pic>
             <p:nvPicPr>
               <p:cNvPr id="28" name="Ink 27">
@@ -9823,8 +9824,8 @@
           </p:pic>
         </mc:Fallback>
       </mc:AlternateContent>
-      <mc:AlternateContent xmlns:mc="http://schemas.openxmlformats.org/markup-compatibility/2006">
-        <mc:Choice xmlns:p14="http://schemas.microsoft.com/office/powerpoint/2010/main" Requires="p14">
+      <mc:AlternateContent xmlns:mc="http://schemas.openxmlformats.org/markup-compatibility/2006" xmlns:p14="http://schemas.microsoft.com/office/powerpoint/2010/main">
+        <mc:Choice Requires="p14">
           <p:contentPart p14:bwMode="auto" r:id="rId11">
             <p14:nvContentPartPr>
               <p14:cNvPr id="29" name="Ink 28">
@@ -9843,7 +9844,7 @@
             </p14:xfrm>
           </p:contentPart>
         </mc:Choice>
-        <mc:Fallback>
+        <mc:Fallback xmlns="">
           <p:pic>
             <p:nvPicPr>
               <p:cNvPr id="29" name="Ink 28">
@@ -9874,8 +9875,8 @@
           </p:pic>
         </mc:Fallback>
       </mc:AlternateContent>
-      <mc:AlternateContent xmlns:mc="http://schemas.openxmlformats.org/markup-compatibility/2006">
-        <mc:Choice xmlns:p14="http://schemas.microsoft.com/office/powerpoint/2010/main" Requires="p14">
+      <mc:AlternateContent xmlns:mc="http://schemas.openxmlformats.org/markup-compatibility/2006" xmlns:p14="http://schemas.microsoft.com/office/powerpoint/2010/main">
+        <mc:Choice Requires="p14">
           <p:contentPart p14:bwMode="auto" r:id="rId13">
             <p14:nvContentPartPr>
               <p14:cNvPr id="30" name="Ink 29">
@@ -9894,7 +9895,7 @@
             </p14:xfrm>
           </p:contentPart>
         </mc:Choice>
-        <mc:Fallback>
+        <mc:Fallback xmlns="">
           <p:pic>
             <p:nvPicPr>
               <p:cNvPr id="30" name="Ink 29">
@@ -9925,8 +9926,8 @@
           </p:pic>
         </mc:Fallback>
       </mc:AlternateContent>
-      <mc:AlternateContent xmlns:mc="http://schemas.openxmlformats.org/markup-compatibility/2006">
-        <mc:Choice xmlns:p14="http://schemas.microsoft.com/office/powerpoint/2010/main" Requires="p14">
+      <mc:AlternateContent xmlns:mc="http://schemas.openxmlformats.org/markup-compatibility/2006" xmlns:p14="http://schemas.microsoft.com/office/powerpoint/2010/main">
+        <mc:Choice Requires="p14">
           <p:contentPart p14:bwMode="auto" r:id="rId15">
             <p14:nvContentPartPr>
               <p14:cNvPr id="31" name="Ink 30">
@@ -9945,7 +9946,7 @@
             </p14:xfrm>
           </p:contentPart>
         </mc:Choice>
-        <mc:Fallback>
+        <mc:Fallback xmlns="">
           <p:pic>
             <p:nvPicPr>
               <p:cNvPr id="31" name="Ink 30">
@@ -10006,8 +10007,8 @@
           </a:prstGeom>
         </p:spPr>
       </p:pic>
-      <mc:AlternateContent xmlns:mc="http://schemas.openxmlformats.org/markup-compatibility/2006">
-        <mc:Choice xmlns:p14="http://schemas.microsoft.com/office/powerpoint/2010/main" Requires="p14">
+      <mc:AlternateContent xmlns:mc="http://schemas.openxmlformats.org/markup-compatibility/2006" xmlns:p14="http://schemas.microsoft.com/office/powerpoint/2010/main">
+        <mc:Choice Requires="p14">
           <p:contentPart p14:bwMode="auto" r:id="rId18">
             <p14:nvContentPartPr>
               <p14:cNvPr id="36" name="Ink 35">
@@ -10026,7 +10027,7 @@
             </p14:xfrm>
           </p:contentPart>
         </mc:Choice>
-        <mc:Fallback>
+        <mc:Fallback xmlns="">
           <p:pic>
             <p:nvPicPr>
               <p:cNvPr id="36" name="Ink 35">
@@ -10077,8 +10078,8 @@
             <a:chExt cx="518400" cy="588960"/>
           </a:xfrm>
         </p:grpSpPr>
-        <mc:AlternateContent xmlns:mc="http://schemas.openxmlformats.org/markup-compatibility/2006">
-          <mc:Choice xmlns:p14="http://schemas.microsoft.com/office/powerpoint/2010/main" Requires="p14">
+        <mc:AlternateContent xmlns:mc="http://schemas.openxmlformats.org/markup-compatibility/2006" xmlns:p14="http://schemas.microsoft.com/office/powerpoint/2010/main">
+          <mc:Choice Requires="p14">
             <p:contentPart p14:bwMode="auto" r:id="rId20">
               <p14:nvContentPartPr>
                 <p14:cNvPr id="40" name="Ink 39">
@@ -10097,7 +10098,7 @@
               </p14:xfrm>
             </p:contentPart>
           </mc:Choice>
-          <mc:Fallback>
+          <mc:Fallback xmlns="">
             <p:pic>
               <p:nvPicPr>
                 <p:cNvPr id="40" name="Ink 39">
@@ -10128,8 +10129,8 @@
             </p:pic>
           </mc:Fallback>
         </mc:AlternateContent>
-        <mc:AlternateContent xmlns:mc="http://schemas.openxmlformats.org/markup-compatibility/2006">
-          <mc:Choice xmlns:p14="http://schemas.microsoft.com/office/powerpoint/2010/main" Requires="p14">
+        <mc:AlternateContent xmlns:mc="http://schemas.openxmlformats.org/markup-compatibility/2006" xmlns:p14="http://schemas.microsoft.com/office/powerpoint/2010/main">
+          <mc:Choice Requires="p14">
             <p:contentPart p14:bwMode="auto" r:id="rId22">
               <p14:nvContentPartPr>
                 <p14:cNvPr id="41" name="Ink 40">
@@ -10148,7 +10149,7 @@
               </p14:xfrm>
             </p:contentPart>
           </mc:Choice>
-          <mc:Fallback>
+          <mc:Fallback xmlns="">
             <p:pic>
               <p:nvPicPr>
                 <p:cNvPr id="41" name="Ink 40">
@@ -10180,8 +10181,8 @@
           </mc:Fallback>
         </mc:AlternateContent>
       </p:grpSp>
-      <mc:AlternateContent xmlns:mc="http://schemas.openxmlformats.org/markup-compatibility/2006">
-        <mc:Choice xmlns:p14="http://schemas.microsoft.com/office/powerpoint/2010/main" Requires="p14">
+      <mc:AlternateContent xmlns:mc="http://schemas.openxmlformats.org/markup-compatibility/2006" xmlns:p14="http://schemas.microsoft.com/office/powerpoint/2010/main">
+        <mc:Choice Requires="p14">
           <p:contentPart p14:bwMode="auto" r:id="rId24">
             <p14:nvContentPartPr>
               <p14:cNvPr id="53" name="Ink 52">
@@ -10200,7 +10201,7 @@
             </p14:xfrm>
           </p:contentPart>
         </mc:Choice>
-        <mc:Fallback>
+        <mc:Fallback xmlns="">
           <p:pic>
             <p:nvPicPr>
               <p:cNvPr id="53" name="Ink 52">
@@ -10251,8 +10252,8 @@
             <a:chExt cx="764640" cy="1242720"/>
           </a:xfrm>
         </p:grpSpPr>
-        <mc:AlternateContent xmlns:mc="http://schemas.openxmlformats.org/markup-compatibility/2006">
-          <mc:Choice xmlns:p14="http://schemas.microsoft.com/office/powerpoint/2010/main" Requires="p14">
+        <mc:AlternateContent xmlns:mc="http://schemas.openxmlformats.org/markup-compatibility/2006" xmlns:p14="http://schemas.microsoft.com/office/powerpoint/2010/main">
+          <mc:Choice Requires="p14">
             <p:contentPart p14:bwMode="auto" r:id="rId26">
               <p14:nvContentPartPr>
                 <p14:cNvPr id="43" name="Ink 42">
@@ -10271,7 +10272,7 @@
               </p14:xfrm>
             </p:contentPart>
           </mc:Choice>
-          <mc:Fallback>
+          <mc:Fallback xmlns="">
             <p:pic>
               <p:nvPicPr>
                 <p:cNvPr id="43" name="Ink 42">
@@ -10302,8 +10303,8 @@
             </p:pic>
           </mc:Fallback>
         </mc:AlternateContent>
-        <mc:AlternateContent xmlns:mc="http://schemas.openxmlformats.org/markup-compatibility/2006">
-          <mc:Choice xmlns:p14="http://schemas.microsoft.com/office/powerpoint/2010/main" Requires="p14">
+        <mc:AlternateContent xmlns:mc="http://schemas.openxmlformats.org/markup-compatibility/2006" xmlns:p14="http://schemas.microsoft.com/office/powerpoint/2010/main">
+          <mc:Choice Requires="p14">
             <p:contentPart p14:bwMode="auto" r:id="rId28">
               <p14:nvContentPartPr>
                 <p14:cNvPr id="44" name="Ink 43">
@@ -10322,7 +10323,7 @@
               </p14:xfrm>
             </p:contentPart>
           </mc:Choice>
-          <mc:Fallback>
+          <mc:Fallback xmlns="">
             <p:pic>
               <p:nvPicPr>
                 <p:cNvPr id="44" name="Ink 43">
@@ -10353,8 +10354,8 @@
             </p:pic>
           </mc:Fallback>
         </mc:AlternateContent>
-        <mc:AlternateContent xmlns:mc="http://schemas.openxmlformats.org/markup-compatibility/2006">
-          <mc:Choice xmlns:p14="http://schemas.microsoft.com/office/powerpoint/2010/main" Requires="p14">
+        <mc:AlternateContent xmlns:mc="http://schemas.openxmlformats.org/markup-compatibility/2006" xmlns:p14="http://schemas.microsoft.com/office/powerpoint/2010/main">
+          <mc:Choice Requires="p14">
             <p:contentPart p14:bwMode="auto" r:id="rId30">
               <p14:nvContentPartPr>
                 <p14:cNvPr id="54" name="Ink 53">
@@ -10373,7 +10374,7 @@
               </p14:xfrm>
             </p:contentPart>
           </mc:Choice>
-          <mc:Fallback>
+          <mc:Fallback xmlns="">
             <p:pic>
               <p:nvPicPr>
                 <p:cNvPr id="54" name="Ink 53">
@@ -10404,8 +10405,8 @@
             </p:pic>
           </mc:Fallback>
         </mc:AlternateContent>
-        <mc:AlternateContent xmlns:mc="http://schemas.openxmlformats.org/markup-compatibility/2006">
-          <mc:Choice xmlns:p14="http://schemas.microsoft.com/office/powerpoint/2010/main" Requires="p14">
+        <mc:AlternateContent xmlns:mc="http://schemas.openxmlformats.org/markup-compatibility/2006" xmlns:p14="http://schemas.microsoft.com/office/powerpoint/2010/main">
+          <mc:Choice Requires="p14">
             <p:contentPart p14:bwMode="auto" r:id="rId32">
               <p14:nvContentPartPr>
                 <p14:cNvPr id="55" name="Ink 54">
@@ -10424,7 +10425,7 @@
               </p14:xfrm>
             </p:contentPart>
           </mc:Choice>
-          <mc:Fallback>
+          <mc:Fallback xmlns="">
             <p:pic>
               <p:nvPicPr>
                 <p:cNvPr id="55" name="Ink 54">
@@ -10455,8 +10456,8 @@
             </p:pic>
           </mc:Fallback>
         </mc:AlternateContent>
-        <mc:AlternateContent xmlns:mc="http://schemas.openxmlformats.org/markup-compatibility/2006">
-          <mc:Choice xmlns:p14="http://schemas.microsoft.com/office/powerpoint/2010/main" Requires="p14">
+        <mc:AlternateContent xmlns:mc="http://schemas.openxmlformats.org/markup-compatibility/2006" xmlns:p14="http://schemas.microsoft.com/office/powerpoint/2010/main">
+          <mc:Choice Requires="p14">
             <p:contentPart p14:bwMode="auto" r:id="rId34">
               <p14:nvContentPartPr>
                 <p14:cNvPr id="57" name="Ink 56">
@@ -10475,7 +10476,7 @@
               </p14:xfrm>
             </p:contentPart>
           </mc:Choice>
-          <mc:Fallback>
+          <mc:Fallback xmlns="">
             <p:pic>
               <p:nvPicPr>
                 <p:cNvPr id="57" name="Ink 56">
@@ -10506,8 +10507,8 @@
             </p:pic>
           </mc:Fallback>
         </mc:AlternateContent>
-        <mc:AlternateContent xmlns:mc="http://schemas.openxmlformats.org/markup-compatibility/2006">
-          <mc:Choice xmlns:p14="http://schemas.microsoft.com/office/powerpoint/2010/main" Requires="p14">
+        <mc:AlternateContent xmlns:mc="http://schemas.openxmlformats.org/markup-compatibility/2006" xmlns:p14="http://schemas.microsoft.com/office/powerpoint/2010/main">
+          <mc:Choice Requires="p14">
             <p:contentPart p14:bwMode="auto" r:id="rId36">
               <p14:nvContentPartPr>
                 <p14:cNvPr id="58" name="Ink 57">
@@ -10526,7 +10527,7 @@
               </p14:xfrm>
             </p:contentPart>
           </mc:Choice>
-          <mc:Fallback>
+          <mc:Fallback xmlns="">
             <p:pic>
               <p:nvPicPr>
                 <p:cNvPr id="58" name="Ink 57">
@@ -10578,8 +10579,8 @@
             <a:chExt cx="684000" cy="294120"/>
           </a:xfrm>
         </p:grpSpPr>
-        <mc:AlternateContent xmlns:mc="http://schemas.openxmlformats.org/markup-compatibility/2006">
-          <mc:Choice xmlns:p14="http://schemas.microsoft.com/office/powerpoint/2010/main" Requires="p14">
+        <mc:AlternateContent xmlns:mc="http://schemas.openxmlformats.org/markup-compatibility/2006" xmlns:p14="http://schemas.microsoft.com/office/powerpoint/2010/main">
+          <mc:Choice Requires="p14">
             <p:contentPart p14:bwMode="auto" r:id="rId38">
               <p14:nvContentPartPr>
                 <p14:cNvPr id="46" name="Ink 45">
@@ -10598,7 +10599,7 @@
               </p14:xfrm>
             </p:contentPart>
           </mc:Choice>
-          <mc:Fallback>
+          <mc:Fallback xmlns="">
             <p:pic>
               <p:nvPicPr>
                 <p:cNvPr id="46" name="Ink 45">
@@ -10629,8 +10630,8 @@
             </p:pic>
           </mc:Fallback>
         </mc:AlternateContent>
-        <mc:AlternateContent xmlns:mc="http://schemas.openxmlformats.org/markup-compatibility/2006">
-          <mc:Choice xmlns:p14="http://schemas.microsoft.com/office/powerpoint/2010/main" Requires="p14">
+        <mc:AlternateContent xmlns:mc="http://schemas.openxmlformats.org/markup-compatibility/2006" xmlns:p14="http://schemas.microsoft.com/office/powerpoint/2010/main">
+          <mc:Choice Requires="p14">
             <p:contentPart p14:bwMode="auto" r:id="rId40">
               <p14:nvContentPartPr>
                 <p14:cNvPr id="47" name="Ink 46">
@@ -10649,7 +10650,7 @@
               </p14:xfrm>
             </p:contentPart>
           </mc:Choice>
-          <mc:Fallback>
+          <mc:Fallback xmlns="">
             <p:pic>
               <p:nvPicPr>
                 <p:cNvPr id="47" name="Ink 46">
@@ -10680,8 +10681,8 @@
             </p:pic>
           </mc:Fallback>
         </mc:AlternateContent>
-        <mc:AlternateContent xmlns:mc="http://schemas.openxmlformats.org/markup-compatibility/2006">
-          <mc:Choice xmlns:p14="http://schemas.microsoft.com/office/powerpoint/2010/main" Requires="p14">
+        <mc:AlternateContent xmlns:mc="http://schemas.openxmlformats.org/markup-compatibility/2006" xmlns:p14="http://schemas.microsoft.com/office/powerpoint/2010/main">
+          <mc:Choice Requires="p14">
             <p:contentPart p14:bwMode="auto" r:id="rId42">
               <p14:nvContentPartPr>
                 <p14:cNvPr id="60" name="Ink 59">
@@ -10700,7 +10701,7 @@
               </p14:xfrm>
             </p:contentPart>
           </mc:Choice>
-          <mc:Fallback>
+          <mc:Fallback xmlns="">
             <p:pic>
               <p:nvPicPr>
                 <p:cNvPr id="60" name="Ink 59">
@@ -10731,8 +10732,8 @@
             </p:pic>
           </mc:Fallback>
         </mc:AlternateContent>
-        <mc:AlternateContent xmlns:mc="http://schemas.openxmlformats.org/markup-compatibility/2006">
-          <mc:Choice xmlns:p14="http://schemas.microsoft.com/office/powerpoint/2010/main" Requires="p14">
+        <mc:AlternateContent xmlns:mc="http://schemas.openxmlformats.org/markup-compatibility/2006" xmlns:p14="http://schemas.microsoft.com/office/powerpoint/2010/main">
+          <mc:Choice Requires="p14">
             <p:contentPart p14:bwMode="auto" r:id="rId44">
               <p14:nvContentPartPr>
                 <p14:cNvPr id="61" name="Ink 60">
@@ -10751,7 +10752,7 @@
               </p14:xfrm>
             </p:contentPart>
           </mc:Choice>
-          <mc:Fallback>
+          <mc:Fallback xmlns="">
             <p:pic>
               <p:nvPicPr>
                 <p:cNvPr id="61" name="Ink 60">
@@ -10803,8 +10804,8 @@
             <a:chExt cx="2696400" cy="481680"/>
           </a:xfrm>
         </p:grpSpPr>
-        <mc:AlternateContent xmlns:mc="http://schemas.openxmlformats.org/markup-compatibility/2006">
-          <mc:Choice xmlns:p14="http://schemas.microsoft.com/office/powerpoint/2010/main" Requires="p14">
+        <mc:AlternateContent xmlns:mc="http://schemas.openxmlformats.org/markup-compatibility/2006" xmlns:p14="http://schemas.microsoft.com/office/powerpoint/2010/main">
+          <mc:Choice Requires="p14">
             <p:contentPart p14:bwMode="auto" r:id="rId46">
               <p14:nvContentPartPr>
                 <p14:cNvPr id="49" name="Ink 48">
@@ -10823,7 +10824,7 @@
               </p14:xfrm>
             </p:contentPart>
           </mc:Choice>
-          <mc:Fallback>
+          <mc:Fallback xmlns="">
             <p:pic>
               <p:nvPicPr>
                 <p:cNvPr id="49" name="Ink 48">
@@ -10854,8 +10855,8 @@
             </p:pic>
           </mc:Fallback>
         </mc:AlternateContent>
-        <mc:AlternateContent xmlns:mc="http://schemas.openxmlformats.org/markup-compatibility/2006">
-          <mc:Choice xmlns:p14="http://schemas.microsoft.com/office/powerpoint/2010/main" Requires="p14">
+        <mc:AlternateContent xmlns:mc="http://schemas.openxmlformats.org/markup-compatibility/2006" xmlns:p14="http://schemas.microsoft.com/office/powerpoint/2010/main">
+          <mc:Choice Requires="p14">
             <p:contentPart p14:bwMode="auto" r:id="rId48">
               <p14:nvContentPartPr>
                 <p14:cNvPr id="50" name="Ink 49">
@@ -10874,7 +10875,7 @@
               </p14:xfrm>
             </p:contentPart>
           </mc:Choice>
-          <mc:Fallback>
+          <mc:Fallback xmlns="">
             <p:pic>
               <p:nvPicPr>
                 <p:cNvPr id="50" name="Ink 49">
@@ -10905,8 +10906,8 @@
             </p:pic>
           </mc:Fallback>
         </mc:AlternateContent>
-        <mc:AlternateContent xmlns:mc="http://schemas.openxmlformats.org/markup-compatibility/2006">
-          <mc:Choice xmlns:p14="http://schemas.microsoft.com/office/powerpoint/2010/main" Requires="p14">
+        <mc:AlternateContent xmlns:mc="http://schemas.openxmlformats.org/markup-compatibility/2006" xmlns:p14="http://schemas.microsoft.com/office/powerpoint/2010/main">
+          <mc:Choice Requires="p14">
             <p:contentPart p14:bwMode="auto" r:id="rId50">
               <p14:nvContentPartPr>
                 <p14:cNvPr id="51" name="Ink 50">
@@ -10925,7 +10926,7 @@
               </p14:xfrm>
             </p:contentPart>
           </mc:Choice>
-          <mc:Fallback>
+          <mc:Fallback xmlns="">
             <p:pic>
               <p:nvPicPr>
                 <p:cNvPr id="51" name="Ink 50">
@@ -10956,8 +10957,8 @@
             </p:pic>
           </mc:Fallback>
         </mc:AlternateContent>
-        <mc:AlternateContent xmlns:mc="http://schemas.openxmlformats.org/markup-compatibility/2006">
-          <mc:Choice xmlns:p14="http://schemas.microsoft.com/office/powerpoint/2010/main" Requires="p14">
+        <mc:AlternateContent xmlns:mc="http://schemas.openxmlformats.org/markup-compatibility/2006" xmlns:p14="http://schemas.microsoft.com/office/powerpoint/2010/main">
+          <mc:Choice Requires="p14">
             <p:contentPart p14:bwMode="auto" r:id="rId52">
               <p14:nvContentPartPr>
                 <p14:cNvPr id="63" name="Ink 62">
@@ -10976,7 +10977,7 @@
               </p14:xfrm>
             </p:contentPart>
           </mc:Choice>
-          <mc:Fallback>
+          <mc:Fallback xmlns="">
             <p:pic>
               <p:nvPicPr>
                 <p:cNvPr id="63" name="Ink 62">
@@ -11007,8 +11008,8 @@
             </p:pic>
           </mc:Fallback>
         </mc:AlternateContent>
-        <mc:AlternateContent xmlns:mc="http://schemas.openxmlformats.org/markup-compatibility/2006">
-          <mc:Choice xmlns:p14="http://schemas.microsoft.com/office/powerpoint/2010/main" Requires="p14">
+        <mc:AlternateContent xmlns:mc="http://schemas.openxmlformats.org/markup-compatibility/2006" xmlns:p14="http://schemas.microsoft.com/office/powerpoint/2010/main">
+          <mc:Choice Requires="p14">
             <p:contentPart p14:bwMode="auto" r:id="rId54">
               <p14:nvContentPartPr>
                 <p14:cNvPr id="65" name="Ink 64">
@@ -11027,7 +11028,7 @@
               </p14:xfrm>
             </p:contentPart>
           </mc:Choice>
-          <mc:Fallback>
+          <mc:Fallback xmlns="">
             <p:pic>
               <p:nvPicPr>
                 <p:cNvPr id="65" name="Ink 64">
@@ -11079,8 +11080,8 @@
             <a:chExt cx="5357160" cy="1104387"/>
           </a:xfrm>
         </p:grpSpPr>
-        <mc:AlternateContent xmlns:mc="http://schemas.openxmlformats.org/markup-compatibility/2006">
-          <mc:Choice xmlns:p14="http://schemas.microsoft.com/office/powerpoint/2010/main" Requires="p14">
+        <mc:AlternateContent xmlns:mc="http://schemas.openxmlformats.org/markup-compatibility/2006" xmlns:p14="http://schemas.microsoft.com/office/powerpoint/2010/main">
+          <mc:Choice Requires="p14">
             <p:contentPart p14:bwMode="auto" r:id="rId56">
               <p14:nvContentPartPr>
                 <p14:cNvPr id="37" name="Ink 36">
@@ -11099,7 +11100,7 @@
               </p14:xfrm>
             </p:contentPart>
           </mc:Choice>
-          <mc:Fallback>
+          <mc:Fallback xmlns="">
             <p:pic>
               <p:nvPicPr>
                 <p:cNvPr id="37" name="Ink 36">
@@ -11130,8 +11131,8 @@
             </p:pic>
           </mc:Fallback>
         </mc:AlternateContent>
-        <mc:AlternateContent xmlns:mc="http://schemas.openxmlformats.org/markup-compatibility/2006">
-          <mc:Choice xmlns:p14="http://schemas.microsoft.com/office/powerpoint/2010/main" Requires="p14">
+        <mc:AlternateContent xmlns:mc="http://schemas.openxmlformats.org/markup-compatibility/2006" xmlns:p14="http://schemas.microsoft.com/office/powerpoint/2010/main">
+          <mc:Choice Requires="p14">
             <p:contentPart p14:bwMode="auto" r:id="rId58">
               <p14:nvContentPartPr>
                 <p14:cNvPr id="38" name="Ink 37">
@@ -11150,7 +11151,7 @@
               </p14:xfrm>
             </p:contentPart>
           </mc:Choice>
-          <mc:Fallback>
+          <mc:Fallback xmlns="">
             <p:pic>
               <p:nvPicPr>
                 <p:cNvPr id="38" name="Ink 37">
@@ -11181,8 +11182,8 @@
             </p:pic>
           </mc:Fallback>
         </mc:AlternateContent>
-        <mc:AlternateContent xmlns:mc="http://schemas.openxmlformats.org/markup-compatibility/2006">
-          <mc:Choice xmlns:p14="http://schemas.microsoft.com/office/powerpoint/2010/main" Requires="p14">
+        <mc:AlternateContent xmlns:mc="http://schemas.openxmlformats.org/markup-compatibility/2006" xmlns:p14="http://schemas.microsoft.com/office/powerpoint/2010/main">
+          <mc:Choice Requires="p14">
             <p:contentPart p14:bwMode="auto" r:id="rId60">
               <p14:nvContentPartPr>
                 <p14:cNvPr id="67" name="Ink 66">
@@ -11201,7 +11202,7 @@
               </p14:xfrm>
             </p:contentPart>
           </mc:Choice>
-          <mc:Fallback>
+          <mc:Fallback xmlns="">
             <p:pic>
               <p:nvPicPr>
                 <p:cNvPr id="67" name="Ink 66">
@@ -11233,8 +11234,8 @@
           </mc:Fallback>
         </mc:AlternateContent>
       </p:grpSp>
-      <mc:AlternateContent xmlns:mc="http://schemas.openxmlformats.org/markup-compatibility/2006">
-        <mc:Choice xmlns:p14="http://schemas.microsoft.com/office/powerpoint/2010/main" Requires="p14">
+      <mc:AlternateContent xmlns:mc="http://schemas.openxmlformats.org/markup-compatibility/2006" xmlns:p14="http://schemas.microsoft.com/office/powerpoint/2010/main">
+        <mc:Choice Requires="p14">
           <p:contentPart p14:bwMode="auto" r:id="rId62">
             <p14:nvContentPartPr>
               <p14:cNvPr id="69" name="Ink 68">
@@ -11253,7 +11254,7 @@
             </p14:xfrm>
           </p:contentPart>
         </mc:Choice>
-        <mc:Fallback>
+        <mc:Fallback xmlns="">
           <p:pic>
             <p:nvPicPr>
               <p:cNvPr id="69" name="Ink 68">
@@ -11284,8 +11285,8 @@
           </p:pic>
         </mc:Fallback>
       </mc:AlternateContent>
-      <mc:AlternateContent xmlns:mc="http://schemas.openxmlformats.org/markup-compatibility/2006">
-        <mc:Choice xmlns:p14="http://schemas.microsoft.com/office/powerpoint/2010/main" Requires="p14">
+      <mc:AlternateContent xmlns:mc="http://schemas.openxmlformats.org/markup-compatibility/2006" xmlns:p14="http://schemas.microsoft.com/office/powerpoint/2010/main">
+        <mc:Choice Requires="p14">
           <p:contentPart p14:bwMode="auto" r:id="rId64">
             <p14:nvContentPartPr>
               <p14:cNvPr id="70" name="Ink 69">
@@ -11304,7 +11305,7 @@
             </p14:xfrm>
           </p:contentPart>
         </mc:Choice>
-        <mc:Fallback>
+        <mc:Fallback xmlns="">
           <p:pic>
             <p:nvPicPr>
               <p:cNvPr id="70" name="Ink 69">
@@ -11466,8 +11467,8 @@
           </a:p>
         </p:txBody>
       </p:sp>
-      <mc:AlternateContent xmlns:mc="http://schemas.openxmlformats.org/markup-compatibility/2006">
-        <mc:Choice xmlns:p14="http://schemas.microsoft.com/office/powerpoint/2010/main" Requires="p14">
+      <mc:AlternateContent xmlns:mc="http://schemas.openxmlformats.org/markup-compatibility/2006" xmlns:p14="http://schemas.microsoft.com/office/powerpoint/2010/main">
+        <mc:Choice Requires="p14">
           <p:contentPart p14:bwMode="auto" r:id="rId2">
             <p14:nvContentPartPr>
               <p14:cNvPr id="2" name="Ink 1">
@@ -11486,7 +11487,7 @@
             </p14:xfrm>
           </p:contentPart>
         </mc:Choice>
-        <mc:Fallback>
+        <mc:Fallback xmlns="">
           <p:pic>
             <p:nvPicPr>
               <p:cNvPr id="2" name="Ink 1">
@@ -11791,8 +11792,8 @@
               <a:chExt cx="414720" cy="533520"/>
             </a:xfrm>
           </p:grpSpPr>
-          <mc:AlternateContent xmlns:mc="http://schemas.openxmlformats.org/markup-compatibility/2006">
-            <mc:Choice xmlns:p14="http://schemas.microsoft.com/office/powerpoint/2010/main" Requires="p14">
+          <mc:AlternateContent xmlns:mc="http://schemas.openxmlformats.org/markup-compatibility/2006" xmlns:p14="http://schemas.microsoft.com/office/powerpoint/2010/main">
+            <mc:Choice Requires="p14">
               <p:contentPart p14:bwMode="auto" r:id="rId3">
                 <p14:nvContentPartPr>
                   <p14:cNvPr id="17" name="Ink 16">
@@ -11811,7 +11812,7 @@
                 </p14:xfrm>
               </p:contentPart>
             </mc:Choice>
-            <mc:Fallback>
+            <mc:Fallback xmlns="">
               <p:pic>
                 <p:nvPicPr>
                   <p:cNvPr id="17" name="Ink 16">
@@ -11842,8 +11843,8 @@
               </p:pic>
             </mc:Fallback>
           </mc:AlternateContent>
-          <mc:AlternateContent xmlns:mc="http://schemas.openxmlformats.org/markup-compatibility/2006">
-            <mc:Choice xmlns:p14="http://schemas.microsoft.com/office/powerpoint/2010/main" Requires="p14">
+          <mc:AlternateContent xmlns:mc="http://schemas.openxmlformats.org/markup-compatibility/2006" xmlns:p14="http://schemas.microsoft.com/office/powerpoint/2010/main">
+            <mc:Choice Requires="p14">
               <p:contentPart p14:bwMode="auto" r:id="rId5">
                 <p14:nvContentPartPr>
                   <p14:cNvPr id="19" name="Ink 18">
@@ -11862,7 +11863,7 @@
                 </p14:xfrm>
               </p:contentPart>
             </mc:Choice>
-            <mc:Fallback>
+            <mc:Fallback xmlns="">
               <p:pic>
                 <p:nvPicPr>
                   <p:cNvPr id="19" name="Ink 18">
@@ -11893,8 +11894,8 @@
               </p:pic>
             </mc:Fallback>
           </mc:AlternateContent>
-          <mc:AlternateContent xmlns:mc="http://schemas.openxmlformats.org/markup-compatibility/2006">
-            <mc:Choice xmlns:p14="http://schemas.microsoft.com/office/powerpoint/2010/main" Requires="p14">
+          <mc:AlternateContent xmlns:mc="http://schemas.openxmlformats.org/markup-compatibility/2006" xmlns:p14="http://schemas.microsoft.com/office/powerpoint/2010/main">
+            <mc:Choice Requires="p14">
               <p:contentPart p14:bwMode="auto" r:id="rId7">
                 <p14:nvContentPartPr>
                   <p14:cNvPr id="25" name="Ink 24">
@@ -11913,7 +11914,7 @@
                 </p14:xfrm>
               </p:contentPart>
             </mc:Choice>
-            <mc:Fallback>
+            <mc:Fallback xmlns="">
               <p:pic>
                 <p:nvPicPr>
                   <p:cNvPr id="25" name="Ink 24">
@@ -11965,8 +11966,8 @@
               <a:chExt cx="912960" cy="299520"/>
             </a:xfrm>
           </p:grpSpPr>
-          <mc:AlternateContent xmlns:mc="http://schemas.openxmlformats.org/markup-compatibility/2006">
-            <mc:Choice xmlns:p14="http://schemas.microsoft.com/office/powerpoint/2010/main" Requires="p14">
+          <mc:AlternateContent xmlns:mc="http://schemas.openxmlformats.org/markup-compatibility/2006" xmlns:p14="http://schemas.microsoft.com/office/powerpoint/2010/main">
+            <mc:Choice Requires="p14">
               <p:contentPart p14:bwMode="auto" r:id="rId9">
                 <p14:nvContentPartPr>
                   <p14:cNvPr id="27" name="Ink 26">
@@ -11985,7 +11986,7 @@
                 </p14:xfrm>
               </p:contentPart>
             </mc:Choice>
-            <mc:Fallback>
+            <mc:Fallback xmlns="">
               <p:pic>
                 <p:nvPicPr>
                   <p:cNvPr id="27" name="Ink 26">
@@ -12016,8 +12017,8 @@
               </p:pic>
             </mc:Fallback>
           </mc:AlternateContent>
-          <mc:AlternateContent xmlns:mc="http://schemas.openxmlformats.org/markup-compatibility/2006">
-            <mc:Choice xmlns:p14="http://schemas.microsoft.com/office/powerpoint/2010/main" Requires="p14">
+          <mc:AlternateContent xmlns:mc="http://schemas.openxmlformats.org/markup-compatibility/2006" xmlns:p14="http://schemas.microsoft.com/office/powerpoint/2010/main">
+            <mc:Choice Requires="p14">
               <p:contentPart p14:bwMode="auto" r:id="rId11">
                 <p14:nvContentPartPr>
                   <p14:cNvPr id="28" name="Ink 27">
@@ -12036,7 +12037,7 @@
                 </p14:xfrm>
               </p:contentPart>
             </mc:Choice>
-            <mc:Fallback>
+            <mc:Fallback xmlns="">
               <p:pic>
                 <p:nvPicPr>
                   <p:cNvPr id="28" name="Ink 27">
@@ -12068,8 +12069,8 @@
             </mc:Fallback>
           </mc:AlternateContent>
         </p:grpSp>
-        <mc:AlternateContent xmlns:mc="http://schemas.openxmlformats.org/markup-compatibility/2006">
-          <mc:Choice xmlns:p14="http://schemas.microsoft.com/office/powerpoint/2010/main" Requires="p14">
+        <mc:AlternateContent xmlns:mc="http://schemas.openxmlformats.org/markup-compatibility/2006" xmlns:p14="http://schemas.microsoft.com/office/powerpoint/2010/main">
+          <mc:Choice Requires="p14">
             <p:contentPart p14:bwMode="auto" r:id="rId13">
               <p14:nvContentPartPr>
                 <p14:cNvPr id="30" name="Ink 29">
@@ -12088,7 +12089,7 @@
               </p14:xfrm>
             </p:contentPart>
           </mc:Choice>
-          <mc:Fallback>
+          <mc:Fallback xmlns="">
             <p:pic>
               <p:nvPicPr>
                 <p:cNvPr id="30" name="Ink 29">
@@ -12139,8 +12140,8 @@
               <a:chExt cx="525240" cy="254880"/>
             </a:xfrm>
           </p:grpSpPr>
-          <mc:AlternateContent xmlns:mc="http://schemas.openxmlformats.org/markup-compatibility/2006">
-            <mc:Choice xmlns:p14="http://schemas.microsoft.com/office/powerpoint/2010/main" Requires="p14">
+          <mc:AlternateContent xmlns:mc="http://schemas.openxmlformats.org/markup-compatibility/2006" xmlns:p14="http://schemas.microsoft.com/office/powerpoint/2010/main">
+            <mc:Choice Requires="p14">
               <p:contentPart p14:bwMode="auto" r:id="rId15">
                 <p14:nvContentPartPr>
                   <p14:cNvPr id="31" name="Ink 30">
@@ -12159,7 +12160,7 @@
                 </p14:xfrm>
               </p:contentPart>
             </mc:Choice>
-            <mc:Fallback>
+            <mc:Fallback xmlns="">
               <p:pic>
                 <p:nvPicPr>
                   <p:cNvPr id="31" name="Ink 30">
@@ -12190,8 +12191,8 @@
               </p:pic>
             </mc:Fallback>
           </mc:AlternateContent>
-          <mc:AlternateContent xmlns:mc="http://schemas.openxmlformats.org/markup-compatibility/2006">
-            <mc:Choice xmlns:p14="http://schemas.microsoft.com/office/powerpoint/2010/main" Requires="p14">
+          <mc:AlternateContent xmlns:mc="http://schemas.openxmlformats.org/markup-compatibility/2006" xmlns:p14="http://schemas.microsoft.com/office/powerpoint/2010/main">
+            <mc:Choice Requires="p14">
               <p:contentPart p14:bwMode="auto" r:id="rId17">
                 <p14:nvContentPartPr>
                   <p14:cNvPr id="32" name="Ink 31">
@@ -12210,7 +12211,7 @@
                 </p14:xfrm>
               </p:contentPart>
             </mc:Choice>
-            <mc:Fallback>
+            <mc:Fallback xmlns="">
               <p:pic>
                 <p:nvPicPr>
                   <p:cNvPr id="32" name="Ink 31">
@@ -12241,8 +12242,8 @@
               </p:pic>
             </mc:Fallback>
           </mc:AlternateContent>
-          <mc:AlternateContent xmlns:mc="http://schemas.openxmlformats.org/markup-compatibility/2006">
-            <mc:Choice xmlns:p14="http://schemas.microsoft.com/office/powerpoint/2010/main" Requires="p14">
+          <mc:AlternateContent xmlns:mc="http://schemas.openxmlformats.org/markup-compatibility/2006" xmlns:p14="http://schemas.microsoft.com/office/powerpoint/2010/main">
+            <mc:Choice Requires="p14">
               <p:contentPart p14:bwMode="auto" r:id="rId19">
                 <p14:nvContentPartPr>
                   <p14:cNvPr id="33" name="Ink 32">
@@ -12261,7 +12262,7 @@
                 </p14:xfrm>
               </p:contentPart>
             </mc:Choice>
-            <mc:Fallback>
+            <mc:Fallback xmlns="">
               <p:pic>
                 <p:nvPicPr>
                   <p:cNvPr id="33" name="Ink 32">
@@ -12292,8 +12293,8 @@
               </p:pic>
             </mc:Fallback>
           </mc:AlternateContent>
-          <mc:AlternateContent xmlns:mc="http://schemas.openxmlformats.org/markup-compatibility/2006">
-            <mc:Choice xmlns:p14="http://schemas.microsoft.com/office/powerpoint/2010/main" Requires="p14">
+          <mc:AlternateContent xmlns:mc="http://schemas.openxmlformats.org/markup-compatibility/2006" xmlns:p14="http://schemas.microsoft.com/office/powerpoint/2010/main">
+            <mc:Choice Requires="p14">
               <p:contentPart p14:bwMode="auto" r:id="rId21">
                 <p14:nvContentPartPr>
                   <p14:cNvPr id="34" name="Ink 33">
@@ -12312,7 +12313,7 @@
                 </p14:xfrm>
               </p:contentPart>
             </mc:Choice>
-            <mc:Fallback>
+            <mc:Fallback xmlns="">
               <p:pic>
                 <p:nvPicPr>
                   <p:cNvPr id="34" name="Ink 33">
@@ -12343,8 +12344,8 @@
               </p:pic>
             </mc:Fallback>
           </mc:AlternateContent>
-          <mc:AlternateContent xmlns:mc="http://schemas.openxmlformats.org/markup-compatibility/2006">
-            <mc:Choice xmlns:p14="http://schemas.microsoft.com/office/powerpoint/2010/main" Requires="p14">
+          <mc:AlternateContent xmlns:mc="http://schemas.openxmlformats.org/markup-compatibility/2006" xmlns:p14="http://schemas.microsoft.com/office/powerpoint/2010/main">
+            <mc:Choice Requires="p14">
               <p:contentPart p14:bwMode="auto" r:id="rId23">
                 <p14:nvContentPartPr>
                   <p14:cNvPr id="35" name="Ink 34">
@@ -12363,7 +12364,7 @@
                 </p14:xfrm>
               </p:contentPart>
             </mc:Choice>
-            <mc:Fallback>
+            <mc:Fallback xmlns="">
               <p:pic>
                 <p:nvPicPr>
                   <p:cNvPr id="35" name="Ink 34">
@@ -12394,8 +12395,8 @@
               </p:pic>
             </mc:Fallback>
           </mc:AlternateContent>
-          <mc:AlternateContent xmlns:mc="http://schemas.openxmlformats.org/markup-compatibility/2006">
-            <mc:Choice xmlns:p14="http://schemas.microsoft.com/office/powerpoint/2010/main" Requires="p14">
+          <mc:AlternateContent xmlns:mc="http://schemas.openxmlformats.org/markup-compatibility/2006" xmlns:p14="http://schemas.microsoft.com/office/powerpoint/2010/main">
+            <mc:Choice Requires="p14">
               <p:contentPart p14:bwMode="auto" r:id="rId25">
                 <p14:nvContentPartPr>
                   <p14:cNvPr id="36" name="Ink 35">
@@ -12414,7 +12415,7 @@
                 </p14:xfrm>
               </p:contentPart>
             </mc:Choice>
-            <mc:Fallback>
+            <mc:Fallback xmlns="">
               <p:pic>
                 <p:nvPicPr>
                   <p:cNvPr id="36" name="Ink 35">
@@ -12445,8 +12446,8 @@
               </p:pic>
             </mc:Fallback>
           </mc:AlternateContent>
-          <mc:AlternateContent xmlns:mc="http://schemas.openxmlformats.org/markup-compatibility/2006">
-            <mc:Choice xmlns:p14="http://schemas.microsoft.com/office/powerpoint/2010/main" Requires="p14">
+          <mc:AlternateContent xmlns:mc="http://schemas.openxmlformats.org/markup-compatibility/2006" xmlns:p14="http://schemas.microsoft.com/office/powerpoint/2010/main">
+            <mc:Choice Requires="p14">
               <p:contentPart p14:bwMode="auto" r:id="rId27">
                 <p14:nvContentPartPr>
                   <p14:cNvPr id="37" name="Ink 36">
@@ -12465,7 +12466,7 @@
                 </p14:xfrm>
               </p:contentPart>
             </mc:Choice>
-            <mc:Fallback>
+            <mc:Fallback xmlns="">
               <p:pic>
                 <p:nvPicPr>
                   <p:cNvPr id="37" name="Ink 36">
@@ -12496,8 +12497,8 @@
               </p:pic>
             </mc:Fallback>
           </mc:AlternateContent>
-          <mc:AlternateContent xmlns:mc="http://schemas.openxmlformats.org/markup-compatibility/2006">
-            <mc:Choice xmlns:p14="http://schemas.microsoft.com/office/powerpoint/2010/main" Requires="p14">
+          <mc:AlternateContent xmlns:mc="http://schemas.openxmlformats.org/markup-compatibility/2006" xmlns:p14="http://schemas.microsoft.com/office/powerpoint/2010/main">
+            <mc:Choice Requires="p14">
               <p:contentPart p14:bwMode="auto" r:id="rId29">
                 <p14:nvContentPartPr>
                   <p14:cNvPr id="38" name="Ink 37">
@@ -12516,7 +12517,7 @@
                 </p14:xfrm>
               </p:contentPart>
             </mc:Choice>
-            <mc:Fallback>
+            <mc:Fallback xmlns="">
               <p:pic>
                 <p:nvPicPr>
                   <p:cNvPr id="38" name="Ink 37">
@@ -12579,8 +12580,8 @@
           </a:prstGeom>
         </p:spPr>
       </p:pic>
-      <mc:AlternateContent xmlns:mc="http://schemas.openxmlformats.org/markup-compatibility/2006">
-        <mc:Choice xmlns:p14="http://schemas.microsoft.com/office/powerpoint/2010/main" Requires="p14">
+      <mc:AlternateContent xmlns:mc="http://schemas.openxmlformats.org/markup-compatibility/2006" xmlns:p14="http://schemas.microsoft.com/office/powerpoint/2010/main">
+        <mc:Choice Requires="p14">
           <p:contentPart p14:bwMode="auto" r:id="rId32">
             <p14:nvContentPartPr>
               <p14:cNvPr id="46" name="Ink 45">
@@ -12599,7 +12600,7 @@
             </p14:xfrm>
           </p:contentPart>
         </mc:Choice>
-        <mc:Fallback>
+        <mc:Fallback xmlns="">
           <p:pic>
             <p:nvPicPr>
               <p:cNvPr id="46" name="Ink 45">
@@ -12630,8 +12631,8 @@
           </p:pic>
         </mc:Fallback>
       </mc:AlternateContent>
-      <mc:AlternateContent xmlns:mc="http://schemas.openxmlformats.org/markup-compatibility/2006">
-        <mc:Choice xmlns:p14="http://schemas.microsoft.com/office/powerpoint/2010/main" Requires="p14">
+      <mc:AlternateContent xmlns:mc="http://schemas.openxmlformats.org/markup-compatibility/2006" xmlns:p14="http://schemas.microsoft.com/office/powerpoint/2010/main">
+        <mc:Choice Requires="p14">
           <p:contentPart p14:bwMode="auto" r:id="rId34">
             <p14:nvContentPartPr>
               <p14:cNvPr id="47" name="Ink 46">
@@ -12650,7 +12651,7 @@
             </p14:xfrm>
           </p:contentPart>
         </mc:Choice>
-        <mc:Fallback>
+        <mc:Fallback xmlns="">
           <p:pic>
             <p:nvPicPr>
               <p:cNvPr id="47" name="Ink 46">
@@ -12771,8 +12772,8 @@
           </a:prstGeom>
         </p:spPr>
       </p:pic>
-      <mc:AlternateContent xmlns:mc="http://schemas.openxmlformats.org/markup-compatibility/2006">
-        <mc:Choice xmlns:p14="http://schemas.microsoft.com/office/powerpoint/2010/main" Requires="p14">
+      <mc:AlternateContent xmlns:mc="http://schemas.openxmlformats.org/markup-compatibility/2006" xmlns:p14="http://schemas.microsoft.com/office/powerpoint/2010/main">
+        <mc:Choice Requires="p14">
           <p:contentPart p14:bwMode="auto" r:id="rId4">
             <p14:nvContentPartPr>
               <p14:cNvPr id="11" name="Ink 10">
@@ -12791,7 +12792,7 @@
             </p14:xfrm>
           </p:contentPart>
         </mc:Choice>
-        <mc:Fallback>
+        <mc:Fallback xmlns="">
           <p:pic>
             <p:nvPicPr>
               <p:cNvPr id="11" name="Ink 10">
@@ -12822,8 +12823,8 @@
           </p:pic>
         </mc:Fallback>
       </mc:AlternateContent>
-      <mc:AlternateContent xmlns:mc="http://schemas.openxmlformats.org/markup-compatibility/2006">
-        <mc:Choice xmlns:p14="http://schemas.microsoft.com/office/powerpoint/2010/main" Requires="p14">
+      <mc:AlternateContent xmlns:mc="http://schemas.openxmlformats.org/markup-compatibility/2006" xmlns:p14="http://schemas.microsoft.com/office/powerpoint/2010/main">
+        <mc:Choice Requires="p14">
           <p:contentPart p14:bwMode="auto" r:id="rId6">
             <p14:nvContentPartPr>
               <p14:cNvPr id="13" name="Ink 12">
@@ -12842,7 +12843,7 @@
             </p14:xfrm>
           </p:contentPart>
         </mc:Choice>
-        <mc:Fallback>
+        <mc:Fallback xmlns="">
           <p:pic>
             <p:nvPicPr>
               <p:cNvPr id="13" name="Ink 12">
@@ -12923,8 +12924,8 @@
             <a:chExt cx="1105200" cy="1231200"/>
           </a:xfrm>
         </p:grpSpPr>
-        <mc:AlternateContent xmlns:mc="http://schemas.openxmlformats.org/markup-compatibility/2006">
-          <mc:Choice xmlns:p14="http://schemas.microsoft.com/office/powerpoint/2010/main" Requires="p14">
+        <mc:AlternateContent xmlns:mc="http://schemas.openxmlformats.org/markup-compatibility/2006" xmlns:p14="http://schemas.microsoft.com/office/powerpoint/2010/main">
+          <mc:Choice Requires="p14">
             <p:contentPart p14:bwMode="auto" r:id="rId9">
               <p14:nvContentPartPr>
                 <p14:cNvPr id="17" name="Ink 16">
@@ -12943,7 +12944,7 @@
               </p14:xfrm>
             </p:contentPart>
           </mc:Choice>
-          <mc:Fallback>
+          <mc:Fallback xmlns="">
             <p:pic>
               <p:nvPicPr>
                 <p:cNvPr id="17" name="Ink 16">
@@ -12974,8 +12975,8 @@
             </p:pic>
           </mc:Fallback>
         </mc:AlternateContent>
-        <mc:AlternateContent xmlns:mc="http://schemas.openxmlformats.org/markup-compatibility/2006">
-          <mc:Choice xmlns:p14="http://schemas.microsoft.com/office/powerpoint/2010/main" Requires="p14">
+        <mc:AlternateContent xmlns:mc="http://schemas.openxmlformats.org/markup-compatibility/2006" xmlns:p14="http://schemas.microsoft.com/office/powerpoint/2010/main">
+          <mc:Choice Requires="p14">
             <p:contentPart p14:bwMode="auto" r:id="rId11">
               <p14:nvContentPartPr>
                 <p14:cNvPr id="19" name="Ink 18">
@@ -12994,7 +12995,7 @@
               </p14:xfrm>
             </p:contentPart>
           </mc:Choice>
-          <mc:Fallback>
+          <mc:Fallback xmlns="">
             <p:pic>
               <p:nvPicPr>
                 <p:cNvPr id="19" name="Ink 18">
@@ -13312,8 +13313,8 @@
             <a:chExt cx="412560" cy="666000"/>
           </a:xfrm>
         </p:grpSpPr>
-        <mc:AlternateContent xmlns:mc="http://schemas.openxmlformats.org/markup-compatibility/2006">
-          <mc:Choice xmlns:p14="http://schemas.microsoft.com/office/powerpoint/2010/main" Requires="p14">
+        <mc:AlternateContent xmlns:mc="http://schemas.openxmlformats.org/markup-compatibility/2006" xmlns:p14="http://schemas.microsoft.com/office/powerpoint/2010/main">
+          <mc:Choice Requires="p14">
             <p:contentPart p14:bwMode="auto" r:id="rId14">
               <p14:nvContentPartPr>
                 <p14:cNvPr id="28" name="Ink 27">
@@ -13332,7 +13333,7 @@
               </p14:xfrm>
             </p:contentPart>
           </mc:Choice>
-          <mc:Fallback>
+          <mc:Fallback xmlns="">
             <p:pic>
               <p:nvPicPr>
                 <p:cNvPr id="28" name="Ink 27">
@@ -13363,8 +13364,8 @@
             </p:pic>
           </mc:Fallback>
         </mc:AlternateContent>
-        <mc:AlternateContent xmlns:mc="http://schemas.openxmlformats.org/markup-compatibility/2006">
-          <mc:Choice xmlns:p14="http://schemas.microsoft.com/office/powerpoint/2010/main" Requires="p14">
+        <mc:AlternateContent xmlns:mc="http://schemas.openxmlformats.org/markup-compatibility/2006" xmlns:p14="http://schemas.microsoft.com/office/powerpoint/2010/main">
+          <mc:Choice Requires="p14">
             <p:contentPart p14:bwMode="auto" r:id="rId16">
               <p14:nvContentPartPr>
                 <p14:cNvPr id="29" name="Ink 28">
@@ -13383,7 +13384,7 @@
               </p14:xfrm>
             </p:contentPart>
           </mc:Choice>
-          <mc:Fallback>
+          <mc:Fallback xmlns="">
             <p:pic>
               <p:nvPicPr>
                 <p:cNvPr id="29" name="Ink 28">
@@ -13414,8 +13415,8 @@
             </p:pic>
           </mc:Fallback>
         </mc:AlternateContent>
-        <mc:AlternateContent xmlns:mc="http://schemas.openxmlformats.org/markup-compatibility/2006">
-          <mc:Choice xmlns:p14="http://schemas.microsoft.com/office/powerpoint/2010/main" Requires="p14">
+        <mc:AlternateContent xmlns:mc="http://schemas.openxmlformats.org/markup-compatibility/2006" xmlns:p14="http://schemas.microsoft.com/office/powerpoint/2010/main">
+          <mc:Choice Requires="p14">
             <p:contentPart p14:bwMode="auto" r:id="rId18">
               <p14:nvContentPartPr>
                 <p14:cNvPr id="30" name="Ink 29">
@@ -13434,7 +13435,7 @@
               </p14:xfrm>
             </p:contentPart>
           </mc:Choice>
-          <mc:Fallback>
+          <mc:Fallback xmlns="">
             <p:pic>
               <p:nvPicPr>
                 <p:cNvPr id="30" name="Ink 29">
@@ -13465,8 +13466,8 @@
             </p:pic>
           </mc:Fallback>
         </mc:AlternateContent>
-        <mc:AlternateContent xmlns:mc="http://schemas.openxmlformats.org/markup-compatibility/2006">
-          <mc:Choice xmlns:p14="http://schemas.microsoft.com/office/powerpoint/2010/main" Requires="p14">
+        <mc:AlternateContent xmlns:mc="http://schemas.openxmlformats.org/markup-compatibility/2006" xmlns:p14="http://schemas.microsoft.com/office/powerpoint/2010/main">
+          <mc:Choice Requires="p14">
             <p:contentPart p14:bwMode="auto" r:id="rId20">
               <p14:nvContentPartPr>
                 <p14:cNvPr id="42" name="Ink 41">
@@ -13485,7 +13486,7 @@
               </p14:xfrm>
             </p:contentPart>
           </mc:Choice>
-          <mc:Fallback>
+          <mc:Fallback xmlns="">
             <p:pic>
               <p:nvPicPr>
                 <p:cNvPr id="42" name="Ink 41">
@@ -13516,8 +13517,8 @@
             </p:pic>
           </mc:Fallback>
         </mc:AlternateContent>
-        <mc:AlternateContent xmlns:mc="http://schemas.openxmlformats.org/markup-compatibility/2006">
-          <mc:Choice xmlns:p14="http://schemas.microsoft.com/office/powerpoint/2010/main" Requires="p14">
+        <mc:AlternateContent xmlns:mc="http://schemas.openxmlformats.org/markup-compatibility/2006" xmlns:p14="http://schemas.microsoft.com/office/powerpoint/2010/main">
+          <mc:Choice Requires="p14">
             <p:contentPart p14:bwMode="auto" r:id="rId22">
               <p14:nvContentPartPr>
                 <p14:cNvPr id="44" name="Ink 43">
@@ -13536,7 +13537,7 @@
               </p14:xfrm>
             </p:contentPart>
           </mc:Choice>
-          <mc:Fallback>
+          <mc:Fallback xmlns="">
             <p:pic>
               <p:nvPicPr>
                 <p:cNvPr id="44" name="Ink 43">
@@ -13567,8 +13568,8 @@
             </p:pic>
           </mc:Fallback>
         </mc:AlternateContent>
-        <mc:AlternateContent xmlns:mc="http://schemas.openxmlformats.org/markup-compatibility/2006">
-          <mc:Choice xmlns:p14="http://schemas.microsoft.com/office/powerpoint/2010/main" Requires="p14">
+        <mc:AlternateContent xmlns:mc="http://schemas.openxmlformats.org/markup-compatibility/2006" xmlns:p14="http://schemas.microsoft.com/office/powerpoint/2010/main">
+          <mc:Choice Requires="p14">
             <p:contentPart p14:bwMode="auto" r:id="rId24">
               <p14:nvContentPartPr>
                 <p14:cNvPr id="46" name="Ink 45">
@@ -13587,7 +13588,7 @@
               </p14:xfrm>
             </p:contentPart>
           </mc:Choice>
-          <mc:Fallback>
+          <mc:Fallback xmlns="">
             <p:pic>
               <p:nvPicPr>
                 <p:cNvPr id="46" name="Ink 45">
@@ -13618,8 +13619,8 @@
             </p:pic>
           </mc:Fallback>
         </mc:AlternateContent>
-        <mc:AlternateContent xmlns:mc="http://schemas.openxmlformats.org/markup-compatibility/2006">
-          <mc:Choice xmlns:p14="http://schemas.microsoft.com/office/powerpoint/2010/main" Requires="p14">
+        <mc:AlternateContent xmlns:mc="http://schemas.openxmlformats.org/markup-compatibility/2006" xmlns:p14="http://schemas.microsoft.com/office/powerpoint/2010/main">
+          <mc:Choice Requires="p14">
             <p:contentPart p14:bwMode="auto" r:id="rId26">
               <p14:nvContentPartPr>
                 <p14:cNvPr id="50" name="Ink 49">
@@ -13638,7 +13639,7 @@
               </p14:xfrm>
             </p:contentPart>
           </mc:Choice>
-          <mc:Fallback>
+          <mc:Fallback xmlns="">
             <p:pic>
               <p:nvPicPr>
                 <p:cNvPr id="50" name="Ink 49">
@@ -13669,8 +13670,8 @@
             </p:pic>
           </mc:Fallback>
         </mc:AlternateContent>
-        <mc:AlternateContent xmlns:mc="http://schemas.openxmlformats.org/markup-compatibility/2006">
-          <mc:Choice xmlns:p14="http://schemas.microsoft.com/office/powerpoint/2010/main" Requires="p14">
+        <mc:AlternateContent xmlns:mc="http://schemas.openxmlformats.org/markup-compatibility/2006" xmlns:p14="http://schemas.microsoft.com/office/powerpoint/2010/main">
+          <mc:Choice Requires="p14">
             <p:contentPart p14:bwMode="auto" r:id="rId28">
               <p14:nvContentPartPr>
                 <p14:cNvPr id="51" name="Ink 50">
@@ -13689,7 +13690,7 @@
               </p14:xfrm>
             </p:contentPart>
           </mc:Choice>
-          <mc:Fallback>
+          <mc:Fallback xmlns="">
             <p:pic>
               <p:nvPicPr>
                 <p:cNvPr id="51" name="Ink 50">
@@ -13951,8 +13952,8 @@
           </a:prstGeom>
         </p:spPr>
       </p:pic>
-      <mc:AlternateContent xmlns:mc="http://schemas.openxmlformats.org/markup-compatibility/2006">
-        <mc:Choice xmlns:p14="http://schemas.microsoft.com/office/powerpoint/2010/main" Requires="p14">
+      <mc:AlternateContent xmlns:mc="http://schemas.openxmlformats.org/markup-compatibility/2006" xmlns:p14="http://schemas.microsoft.com/office/powerpoint/2010/main">
+        <mc:Choice Requires="p14">
           <p:contentPart p14:bwMode="auto" r:id="rId31">
             <p14:nvContentPartPr>
               <p14:cNvPr id="60" name="Ink 59">
@@ -13971,7 +13972,7 @@
             </p14:xfrm>
           </p:contentPart>
         </mc:Choice>
-        <mc:Fallback>
+        <mc:Fallback xmlns="">
           <p:pic>
             <p:nvPicPr>
               <p:cNvPr id="60" name="Ink 59">
@@ -14266,8 +14267,8 @@
             <a:chExt cx="435600" cy="401400"/>
           </a:xfrm>
         </p:grpSpPr>
-        <mc:AlternateContent xmlns:mc="http://schemas.openxmlformats.org/markup-compatibility/2006">
-          <mc:Choice xmlns:p14="http://schemas.microsoft.com/office/powerpoint/2010/main" Requires="p14">
+        <mc:AlternateContent xmlns:mc="http://schemas.openxmlformats.org/markup-compatibility/2006" xmlns:p14="http://schemas.microsoft.com/office/powerpoint/2010/main">
+          <mc:Choice Requires="p14">
             <p:contentPart p14:bwMode="auto" r:id="rId34">
               <p14:nvContentPartPr>
                 <p14:cNvPr id="64" name="Ink 63">
@@ -14286,7 +14287,7 @@
               </p14:xfrm>
             </p:contentPart>
           </mc:Choice>
-          <mc:Fallback>
+          <mc:Fallback xmlns="">
             <p:pic>
               <p:nvPicPr>
                 <p:cNvPr id="64" name="Ink 63">
@@ -14317,8 +14318,8 @@
             </p:pic>
           </mc:Fallback>
         </mc:AlternateContent>
-        <mc:AlternateContent xmlns:mc="http://schemas.openxmlformats.org/markup-compatibility/2006">
-          <mc:Choice xmlns:p14="http://schemas.microsoft.com/office/powerpoint/2010/main" Requires="p14">
+        <mc:AlternateContent xmlns:mc="http://schemas.openxmlformats.org/markup-compatibility/2006" xmlns:p14="http://schemas.microsoft.com/office/powerpoint/2010/main">
+          <mc:Choice Requires="p14">
             <p:contentPart p14:bwMode="auto" r:id="rId36">
               <p14:nvContentPartPr>
                 <p14:cNvPr id="65" name="Ink 64">
@@ -14337,7 +14338,7 @@
               </p14:xfrm>
             </p:contentPart>
           </mc:Choice>
-          <mc:Fallback>
+          <mc:Fallback xmlns="">
             <p:pic>
               <p:nvPicPr>
                 <p:cNvPr id="65" name="Ink 64">
@@ -14389,8 +14390,8 @@
             <a:chExt cx="413280" cy="437400"/>
           </a:xfrm>
         </p:grpSpPr>
-        <mc:AlternateContent xmlns:mc="http://schemas.openxmlformats.org/markup-compatibility/2006">
-          <mc:Choice xmlns:p14="http://schemas.microsoft.com/office/powerpoint/2010/main" Requires="p14">
+        <mc:AlternateContent xmlns:mc="http://schemas.openxmlformats.org/markup-compatibility/2006" xmlns:p14="http://schemas.microsoft.com/office/powerpoint/2010/main">
+          <mc:Choice Requires="p14">
             <p:contentPart p14:bwMode="auto" r:id="rId38">
               <p14:nvContentPartPr>
                 <p14:cNvPr id="67" name="Ink 66">
@@ -14409,7 +14410,7 @@
               </p14:xfrm>
             </p:contentPart>
           </mc:Choice>
-          <mc:Fallback>
+          <mc:Fallback xmlns="">
             <p:pic>
               <p:nvPicPr>
                 <p:cNvPr id="67" name="Ink 66">
@@ -14440,8 +14441,8 @@
             </p:pic>
           </mc:Fallback>
         </mc:AlternateContent>
-        <mc:AlternateContent xmlns:mc="http://schemas.openxmlformats.org/markup-compatibility/2006">
-          <mc:Choice xmlns:p14="http://schemas.microsoft.com/office/powerpoint/2010/main" Requires="p14">
+        <mc:AlternateContent xmlns:mc="http://schemas.openxmlformats.org/markup-compatibility/2006" xmlns:p14="http://schemas.microsoft.com/office/powerpoint/2010/main">
+          <mc:Choice Requires="p14">
             <p:contentPart p14:bwMode="auto" r:id="rId40">
               <p14:nvContentPartPr>
                 <p14:cNvPr id="68" name="Ink 67">
@@ -14460,7 +14461,7 @@
               </p14:xfrm>
             </p:contentPart>
           </mc:Choice>
-          <mc:Fallback>
+          <mc:Fallback xmlns="">
             <p:pic>
               <p:nvPicPr>
                 <p:cNvPr id="68" name="Ink 67">
@@ -14512,8 +14513,8 @@
             <a:chExt cx="425160" cy="399600"/>
           </a:xfrm>
         </p:grpSpPr>
-        <mc:AlternateContent xmlns:mc="http://schemas.openxmlformats.org/markup-compatibility/2006">
-          <mc:Choice xmlns:p14="http://schemas.microsoft.com/office/powerpoint/2010/main" Requires="p14">
+        <mc:AlternateContent xmlns:mc="http://schemas.openxmlformats.org/markup-compatibility/2006" xmlns:p14="http://schemas.microsoft.com/office/powerpoint/2010/main">
+          <mc:Choice Requires="p14">
             <p:contentPart p14:bwMode="auto" r:id="rId42">
               <p14:nvContentPartPr>
                 <p14:cNvPr id="70" name="Ink 69">
@@ -14532,7 +14533,7 @@
               </p14:xfrm>
             </p:contentPart>
           </mc:Choice>
-          <mc:Fallback>
+          <mc:Fallback xmlns="">
             <p:pic>
               <p:nvPicPr>
                 <p:cNvPr id="70" name="Ink 69">
@@ -14563,8 +14564,8 @@
             </p:pic>
           </mc:Fallback>
         </mc:AlternateContent>
-        <mc:AlternateContent xmlns:mc="http://schemas.openxmlformats.org/markup-compatibility/2006">
-          <mc:Choice xmlns:p14="http://schemas.microsoft.com/office/powerpoint/2010/main" Requires="p14">
+        <mc:AlternateContent xmlns:mc="http://schemas.openxmlformats.org/markup-compatibility/2006" xmlns:p14="http://schemas.microsoft.com/office/powerpoint/2010/main">
+          <mc:Choice Requires="p14">
             <p:contentPart p14:bwMode="auto" r:id="rId44">
               <p14:nvContentPartPr>
                 <p14:cNvPr id="71" name="Ink 70">
@@ -14583,7 +14584,7 @@
               </p14:xfrm>
             </p:contentPart>
           </mc:Choice>
-          <mc:Fallback>
+          <mc:Fallback xmlns="">
             <p:pic>
               <p:nvPicPr>
                 <p:cNvPr id="71" name="Ink 70">
@@ -14635,8 +14636,8 @@
             <a:chExt cx="635760" cy="507960"/>
           </a:xfrm>
         </p:grpSpPr>
-        <mc:AlternateContent xmlns:mc="http://schemas.openxmlformats.org/markup-compatibility/2006">
-          <mc:Choice xmlns:p14="http://schemas.microsoft.com/office/powerpoint/2010/main" Requires="p14">
+        <mc:AlternateContent xmlns:mc="http://schemas.openxmlformats.org/markup-compatibility/2006" xmlns:p14="http://schemas.microsoft.com/office/powerpoint/2010/main">
+          <mc:Choice Requires="p14">
             <p:contentPart p14:bwMode="auto" r:id="rId46">
               <p14:nvContentPartPr>
                 <p14:cNvPr id="73" name="Ink 72">
@@ -14655,7 +14656,7 @@
               </p14:xfrm>
             </p:contentPart>
           </mc:Choice>
-          <mc:Fallback>
+          <mc:Fallback xmlns="">
             <p:pic>
               <p:nvPicPr>
                 <p:cNvPr id="73" name="Ink 72">
@@ -14686,8 +14687,8 @@
             </p:pic>
           </mc:Fallback>
         </mc:AlternateContent>
-        <mc:AlternateContent xmlns:mc="http://schemas.openxmlformats.org/markup-compatibility/2006">
-          <mc:Choice xmlns:p14="http://schemas.microsoft.com/office/powerpoint/2010/main" Requires="p14">
+        <mc:AlternateContent xmlns:mc="http://schemas.openxmlformats.org/markup-compatibility/2006" xmlns:p14="http://schemas.microsoft.com/office/powerpoint/2010/main">
+          <mc:Choice Requires="p14">
             <p:contentPart p14:bwMode="auto" r:id="rId48">
               <p14:nvContentPartPr>
                 <p14:cNvPr id="74" name="Ink 73">
@@ -14706,7 +14707,7 @@
               </p14:xfrm>
             </p:contentPart>
           </mc:Choice>
-          <mc:Fallback>
+          <mc:Fallback xmlns="">
             <p:pic>
               <p:nvPicPr>
                 <p:cNvPr id="74" name="Ink 73">
@@ -14758,8 +14759,8 @@
             <a:chExt cx="564840" cy="541080"/>
           </a:xfrm>
         </p:grpSpPr>
-        <mc:AlternateContent xmlns:mc="http://schemas.openxmlformats.org/markup-compatibility/2006">
-          <mc:Choice xmlns:p14="http://schemas.microsoft.com/office/powerpoint/2010/main" Requires="p14">
+        <mc:AlternateContent xmlns:mc="http://schemas.openxmlformats.org/markup-compatibility/2006" xmlns:p14="http://schemas.microsoft.com/office/powerpoint/2010/main">
+          <mc:Choice Requires="p14">
             <p:contentPart p14:bwMode="auto" r:id="rId50">
               <p14:nvContentPartPr>
                 <p14:cNvPr id="76" name="Ink 75">
@@ -14778,7 +14779,7 @@
               </p14:xfrm>
             </p:contentPart>
           </mc:Choice>
-          <mc:Fallback>
+          <mc:Fallback xmlns="">
             <p:pic>
               <p:nvPicPr>
                 <p:cNvPr id="76" name="Ink 75">
@@ -14809,8 +14810,8 @@
             </p:pic>
           </mc:Fallback>
         </mc:AlternateContent>
-        <mc:AlternateContent xmlns:mc="http://schemas.openxmlformats.org/markup-compatibility/2006">
-          <mc:Choice xmlns:p14="http://schemas.microsoft.com/office/powerpoint/2010/main" Requires="p14">
+        <mc:AlternateContent xmlns:mc="http://schemas.openxmlformats.org/markup-compatibility/2006" xmlns:p14="http://schemas.microsoft.com/office/powerpoint/2010/main">
+          <mc:Choice Requires="p14">
             <p:contentPart p14:bwMode="auto" r:id="rId52">
               <p14:nvContentPartPr>
                 <p14:cNvPr id="77" name="Ink 76">
@@ -14829,7 +14830,7 @@
               </p14:xfrm>
             </p:contentPart>
           </mc:Choice>
-          <mc:Fallback>
+          <mc:Fallback xmlns="">
             <p:pic>
               <p:nvPicPr>
                 <p:cNvPr id="77" name="Ink 76">
@@ -15310,8 +15311,8 @@
             <a:chExt cx="1235520" cy="512640"/>
           </a:xfrm>
         </p:grpSpPr>
-        <mc:AlternateContent xmlns:mc="http://schemas.openxmlformats.org/markup-compatibility/2006">
-          <mc:Choice xmlns:p14="http://schemas.microsoft.com/office/powerpoint/2010/main" Requires="p14">
+        <mc:AlternateContent xmlns:mc="http://schemas.openxmlformats.org/markup-compatibility/2006" xmlns:p14="http://schemas.microsoft.com/office/powerpoint/2010/main">
+          <mc:Choice Requires="p14">
             <p:contentPart p14:bwMode="auto" r:id="rId5">
               <p14:nvContentPartPr>
                 <p14:cNvPr id="12" name="Ink 11">
@@ -15330,7 +15331,7 @@
               </p14:xfrm>
             </p:contentPart>
           </mc:Choice>
-          <mc:Fallback>
+          <mc:Fallback xmlns="">
             <p:pic>
               <p:nvPicPr>
                 <p:cNvPr id="12" name="Ink 11">
@@ -15361,8 +15362,8 @@
             </p:pic>
           </mc:Fallback>
         </mc:AlternateContent>
-        <mc:AlternateContent xmlns:mc="http://schemas.openxmlformats.org/markup-compatibility/2006">
-          <mc:Choice xmlns:p14="http://schemas.microsoft.com/office/powerpoint/2010/main" Requires="p14">
+        <mc:AlternateContent xmlns:mc="http://schemas.openxmlformats.org/markup-compatibility/2006" xmlns:p14="http://schemas.microsoft.com/office/powerpoint/2010/main">
+          <mc:Choice Requires="p14">
             <p:contentPart p14:bwMode="auto" r:id="rId7">
               <p14:nvContentPartPr>
                 <p14:cNvPr id="13" name="Ink 12">
@@ -15381,7 +15382,7 @@
               </p14:xfrm>
             </p:contentPart>
           </mc:Choice>
-          <mc:Fallback>
+          <mc:Fallback xmlns="">
             <p:pic>
               <p:nvPicPr>
                 <p:cNvPr id="13" name="Ink 12">
@@ -15412,8 +15413,8 @@
             </p:pic>
           </mc:Fallback>
         </mc:AlternateContent>
-        <mc:AlternateContent xmlns:mc="http://schemas.openxmlformats.org/markup-compatibility/2006">
-          <mc:Choice xmlns:p14="http://schemas.microsoft.com/office/powerpoint/2010/main" Requires="p14">
+        <mc:AlternateContent xmlns:mc="http://schemas.openxmlformats.org/markup-compatibility/2006" xmlns:p14="http://schemas.microsoft.com/office/powerpoint/2010/main">
+          <mc:Choice Requires="p14">
             <p:contentPart p14:bwMode="auto" r:id="rId9">
               <p14:nvContentPartPr>
                 <p14:cNvPr id="14" name="Ink 13">
@@ -15432,7 +15433,7 @@
               </p14:xfrm>
             </p:contentPart>
           </mc:Choice>
-          <mc:Fallback>
+          <mc:Fallback xmlns="">
             <p:pic>
               <p:nvPicPr>
                 <p:cNvPr id="14" name="Ink 13">
@@ -15463,8 +15464,8 @@
             </p:pic>
           </mc:Fallback>
         </mc:AlternateContent>
-        <mc:AlternateContent xmlns:mc="http://schemas.openxmlformats.org/markup-compatibility/2006">
-          <mc:Choice xmlns:p14="http://schemas.microsoft.com/office/powerpoint/2010/main" Requires="p14">
+        <mc:AlternateContent xmlns:mc="http://schemas.openxmlformats.org/markup-compatibility/2006" xmlns:p14="http://schemas.microsoft.com/office/powerpoint/2010/main">
+          <mc:Choice Requires="p14">
             <p:contentPart p14:bwMode="auto" r:id="rId11">
               <p14:nvContentPartPr>
                 <p14:cNvPr id="15" name="Ink 14">
@@ -15483,7 +15484,7 @@
               </p14:xfrm>
             </p:contentPart>
           </mc:Choice>
-          <mc:Fallback>
+          <mc:Fallback xmlns="">
             <p:pic>
               <p:nvPicPr>
                 <p:cNvPr id="15" name="Ink 14">
@@ -15514,8 +15515,8 @@
             </p:pic>
           </mc:Fallback>
         </mc:AlternateContent>
-        <mc:AlternateContent xmlns:mc="http://schemas.openxmlformats.org/markup-compatibility/2006">
-          <mc:Choice xmlns:p14="http://schemas.microsoft.com/office/powerpoint/2010/main" Requires="p14">
+        <mc:AlternateContent xmlns:mc="http://schemas.openxmlformats.org/markup-compatibility/2006" xmlns:p14="http://schemas.microsoft.com/office/powerpoint/2010/main">
+          <mc:Choice Requires="p14">
             <p:contentPart p14:bwMode="auto" r:id="rId13">
               <p14:nvContentPartPr>
                 <p14:cNvPr id="16" name="Ink 15">
@@ -15534,7 +15535,7 @@
               </p14:xfrm>
             </p:contentPart>
           </mc:Choice>
-          <mc:Fallback>
+          <mc:Fallback xmlns="">
             <p:pic>
               <p:nvPicPr>
                 <p:cNvPr id="16" name="Ink 15">
@@ -15565,8 +15566,8 @@
             </p:pic>
           </mc:Fallback>
         </mc:AlternateContent>
-        <mc:AlternateContent xmlns:mc="http://schemas.openxmlformats.org/markup-compatibility/2006">
-          <mc:Choice xmlns:p14="http://schemas.microsoft.com/office/powerpoint/2010/main" Requires="p14">
+        <mc:AlternateContent xmlns:mc="http://schemas.openxmlformats.org/markup-compatibility/2006" xmlns:p14="http://schemas.microsoft.com/office/powerpoint/2010/main">
+          <mc:Choice Requires="p14">
             <p:contentPart p14:bwMode="auto" r:id="rId15">
               <p14:nvContentPartPr>
                 <p14:cNvPr id="17" name="Ink 16">
@@ -15585,7 +15586,7 @@
               </p14:xfrm>
             </p:contentPart>
           </mc:Choice>
-          <mc:Fallback>
+          <mc:Fallback xmlns="">
             <p:pic>
               <p:nvPicPr>
                 <p:cNvPr id="17" name="Ink 16">
@@ -15616,8 +15617,8 @@
             </p:pic>
           </mc:Fallback>
         </mc:AlternateContent>
-        <mc:AlternateContent xmlns:mc="http://schemas.openxmlformats.org/markup-compatibility/2006">
-          <mc:Choice xmlns:p14="http://schemas.microsoft.com/office/powerpoint/2010/main" Requires="p14">
+        <mc:AlternateContent xmlns:mc="http://schemas.openxmlformats.org/markup-compatibility/2006" xmlns:p14="http://schemas.microsoft.com/office/powerpoint/2010/main">
+          <mc:Choice Requires="p14">
             <p:contentPart p14:bwMode="auto" r:id="rId17">
               <p14:nvContentPartPr>
                 <p14:cNvPr id="18" name="Ink 17">
@@ -15636,7 +15637,7 @@
               </p14:xfrm>
             </p:contentPart>
           </mc:Choice>
-          <mc:Fallback>
+          <mc:Fallback xmlns="">
             <p:pic>
               <p:nvPicPr>
                 <p:cNvPr id="18" name="Ink 17">
@@ -15667,8 +15668,8 @@
             </p:pic>
           </mc:Fallback>
         </mc:AlternateContent>
-        <mc:AlternateContent xmlns:mc="http://schemas.openxmlformats.org/markup-compatibility/2006">
-          <mc:Choice xmlns:p14="http://schemas.microsoft.com/office/powerpoint/2010/main" Requires="p14">
+        <mc:AlternateContent xmlns:mc="http://schemas.openxmlformats.org/markup-compatibility/2006" xmlns:p14="http://schemas.microsoft.com/office/powerpoint/2010/main">
+          <mc:Choice Requires="p14">
             <p:contentPart p14:bwMode="auto" r:id="rId19">
               <p14:nvContentPartPr>
                 <p14:cNvPr id="19" name="Ink 18">
@@ -15687,7 +15688,7 @@
               </p14:xfrm>
             </p:contentPart>
           </mc:Choice>
-          <mc:Fallback>
+          <mc:Fallback xmlns="">
             <p:pic>
               <p:nvPicPr>
                 <p:cNvPr id="19" name="Ink 18">
@@ -15719,8 +15720,8 @@
           </mc:Fallback>
         </mc:AlternateContent>
       </p:grpSp>
-      <mc:AlternateContent xmlns:mc="http://schemas.openxmlformats.org/markup-compatibility/2006">
-        <mc:Choice xmlns:p14="http://schemas.microsoft.com/office/powerpoint/2010/main" Requires="p14">
+      <mc:AlternateContent xmlns:mc="http://schemas.openxmlformats.org/markup-compatibility/2006" xmlns:p14="http://schemas.microsoft.com/office/powerpoint/2010/main">
+        <mc:Choice Requires="p14">
           <p:contentPart p14:bwMode="auto" r:id="rId21">
             <p14:nvContentPartPr>
               <p14:cNvPr id="21" name="Ink 20">
@@ -15739,7 +15740,7 @@
             </p14:xfrm>
           </p:contentPart>
         </mc:Choice>
-        <mc:Fallback>
+        <mc:Fallback xmlns="">
           <p:pic>
             <p:nvPicPr>
               <p:cNvPr id="21" name="Ink 20">
@@ -15790,8 +15791,8 @@
             <a:chExt cx="540000" cy="351360"/>
           </a:xfrm>
         </p:grpSpPr>
-        <mc:AlternateContent xmlns:mc="http://schemas.openxmlformats.org/markup-compatibility/2006">
-          <mc:Choice xmlns:p14="http://schemas.microsoft.com/office/powerpoint/2010/main" Requires="p14">
+        <mc:AlternateContent xmlns:mc="http://schemas.openxmlformats.org/markup-compatibility/2006" xmlns:p14="http://schemas.microsoft.com/office/powerpoint/2010/main">
+          <mc:Choice Requires="p14">
             <p:contentPart p14:bwMode="auto" r:id="rId23">
               <p14:nvContentPartPr>
                 <p14:cNvPr id="22" name="Ink 21">
@@ -15810,7 +15811,7 @@
               </p14:xfrm>
             </p:contentPart>
           </mc:Choice>
-          <mc:Fallback>
+          <mc:Fallback xmlns="">
             <p:pic>
               <p:nvPicPr>
                 <p:cNvPr id="22" name="Ink 21">
@@ -15841,8 +15842,8 @@
             </p:pic>
           </mc:Fallback>
         </mc:AlternateContent>
-        <mc:AlternateContent xmlns:mc="http://schemas.openxmlformats.org/markup-compatibility/2006">
-          <mc:Choice xmlns:p14="http://schemas.microsoft.com/office/powerpoint/2010/main" Requires="p14">
+        <mc:AlternateContent xmlns:mc="http://schemas.openxmlformats.org/markup-compatibility/2006" xmlns:p14="http://schemas.microsoft.com/office/powerpoint/2010/main">
+          <mc:Choice Requires="p14">
             <p:contentPart p14:bwMode="auto" r:id="rId25">
               <p14:nvContentPartPr>
                 <p14:cNvPr id="23" name="Ink 22">
@@ -15861,7 +15862,7 @@
               </p14:xfrm>
             </p:contentPart>
           </mc:Choice>
-          <mc:Fallback>
+          <mc:Fallback xmlns="">
             <p:pic>
               <p:nvPicPr>
                 <p:cNvPr id="23" name="Ink 22">
@@ -15892,8 +15893,8 @@
             </p:pic>
           </mc:Fallback>
         </mc:AlternateContent>
-        <mc:AlternateContent xmlns:mc="http://schemas.openxmlformats.org/markup-compatibility/2006">
-          <mc:Choice xmlns:p14="http://schemas.microsoft.com/office/powerpoint/2010/main" Requires="p14">
+        <mc:AlternateContent xmlns:mc="http://schemas.openxmlformats.org/markup-compatibility/2006" xmlns:p14="http://schemas.microsoft.com/office/powerpoint/2010/main">
+          <mc:Choice Requires="p14">
             <p:contentPart p14:bwMode="auto" r:id="rId27">
               <p14:nvContentPartPr>
                 <p14:cNvPr id="24" name="Ink 23">
@@ -15912,7 +15913,7 @@
               </p14:xfrm>
             </p:contentPart>
           </mc:Choice>
-          <mc:Fallback>
+          <mc:Fallback xmlns="">
             <p:pic>
               <p:nvPicPr>
                 <p:cNvPr id="24" name="Ink 23">
@@ -15943,8 +15944,8 @@
             </p:pic>
           </mc:Fallback>
         </mc:AlternateContent>
-        <mc:AlternateContent xmlns:mc="http://schemas.openxmlformats.org/markup-compatibility/2006">
-          <mc:Choice xmlns:p14="http://schemas.microsoft.com/office/powerpoint/2010/main" Requires="p14">
+        <mc:AlternateContent xmlns:mc="http://schemas.openxmlformats.org/markup-compatibility/2006" xmlns:p14="http://schemas.microsoft.com/office/powerpoint/2010/main">
+          <mc:Choice Requires="p14">
             <p:contentPart p14:bwMode="auto" r:id="rId29">
               <p14:nvContentPartPr>
                 <p14:cNvPr id="25" name="Ink 24">
@@ -15963,7 +15964,7 @@
               </p14:xfrm>
             </p:contentPart>
           </mc:Choice>
-          <mc:Fallback>
+          <mc:Fallback xmlns="">
             <p:pic>
               <p:nvPicPr>
                 <p:cNvPr id="25" name="Ink 24">
@@ -15994,8 +15995,8 @@
             </p:pic>
           </mc:Fallback>
         </mc:AlternateContent>
-        <mc:AlternateContent xmlns:mc="http://schemas.openxmlformats.org/markup-compatibility/2006">
-          <mc:Choice xmlns:p14="http://schemas.microsoft.com/office/powerpoint/2010/main" Requires="p14">
+        <mc:AlternateContent xmlns:mc="http://schemas.openxmlformats.org/markup-compatibility/2006" xmlns:p14="http://schemas.microsoft.com/office/powerpoint/2010/main">
+          <mc:Choice Requires="p14">
             <p:contentPart p14:bwMode="auto" r:id="rId31">
               <p14:nvContentPartPr>
                 <p14:cNvPr id="26" name="Ink 25">
@@ -16014,7 +16015,7 @@
               </p14:xfrm>
             </p:contentPart>
           </mc:Choice>
-          <mc:Fallback>
+          <mc:Fallback xmlns="">
             <p:pic>
               <p:nvPicPr>
                 <p:cNvPr id="26" name="Ink 25">
@@ -16045,8 +16046,8 @@
             </p:pic>
           </mc:Fallback>
         </mc:AlternateContent>
-        <mc:AlternateContent xmlns:mc="http://schemas.openxmlformats.org/markup-compatibility/2006">
-          <mc:Choice xmlns:p14="http://schemas.microsoft.com/office/powerpoint/2010/main" Requires="p14">
+        <mc:AlternateContent xmlns:mc="http://schemas.openxmlformats.org/markup-compatibility/2006" xmlns:p14="http://schemas.microsoft.com/office/powerpoint/2010/main">
+          <mc:Choice Requires="p14">
             <p:contentPart p14:bwMode="auto" r:id="rId33">
               <p14:nvContentPartPr>
                 <p14:cNvPr id="27" name="Ink 26">
@@ -16065,7 +16066,7 @@
               </p14:xfrm>
             </p:contentPart>
           </mc:Choice>
-          <mc:Fallback>
+          <mc:Fallback xmlns="">
             <p:pic>
               <p:nvPicPr>
                 <p:cNvPr id="27" name="Ink 26">
@@ -16096,8 +16097,8 @@
             </p:pic>
           </mc:Fallback>
         </mc:AlternateContent>
-        <mc:AlternateContent xmlns:mc="http://schemas.openxmlformats.org/markup-compatibility/2006">
-          <mc:Choice xmlns:p14="http://schemas.microsoft.com/office/powerpoint/2010/main" Requires="p14">
+        <mc:AlternateContent xmlns:mc="http://schemas.openxmlformats.org/markup-compatibility/2006" xmlns:p14="http://schemas.microsoft.com/office/powerpoint/2010/main">
+          <mc:Choice Requires="p14">
             <p:contentPart p14:bwMode="auto" r:id="rId35">
               <p14:nvContentPartPr>
                 <p14:cNvPr id="28" name="Ink 27">
@@ -16116,7 +16117,7 @@
               </p14:xfrm>
             </p:contentPart>
           </mc:Choice>
-          <mc:Fallback>
+          <mc:Fallback xmlns="">
             <p:pic>
               <p:nvPicPr>
                 <p:cNvPr id="28" name="Ink 27">
@@ -16152,6 +16153,96 @@
     <p:extLst>
       <p:ext uri="{BB962C8B-B14F-4D97-AF65-F5344CB8AC3E}">
         <p14:creationId xmlns:p14="http://schemas.microsoft.com/office/powerpoint/2010/main" val="2621031833"/>
+      </p:ext>
+    </p:extLst>
+  </p:cSld>
+  <p:clrMapOvr>
+    <a:masterClrMapping/>
+  </p:clrMapOvr>
+</p:sld>
+</file>
+
+<file path=ppt/slides/slide19.xml><?xml version="1.0" encoding="utf-8"?>
+<p:sld xmlns:a="http://schemas.openxmlformats.org/drawingml/2006/main" xmlns:r="http://schemas.openxmlformats.org/officeDocument/2006/relationships" xmlns:p="http://schemas.openxmlformats.org/presentationml/2006/main">
+  <p:cSld>
+    <p:spTree>
+      <p:nvGrpSpPr>
+        <p:cNvPr id="1" name=""/>
+        <p:cNvGrpSpPr/>
+        <p:nvPr/>
+      </p:nvGrpSpPr>
+      <p:grpSpPr>
+        <a:xfrm>
+          <a:off x="0" y="0"/>
+          <a:ext cx="0" cy="0"/>
+          <a:chOff x="0" y="0"/>
+          <a:chExt cx="0" cy="0"/>
+        </a:xfrm>
+      </p:grpSpPr>
+      <p:pic>
+        <p:nvPicPr>
+          <p:cNvPr id="5" name="Picture 4">
+            <a:extLst>
+              <a:ext uri="{FF2B5EF4-FFF2-40B4-BE49-F238E27FC236}">
+                <a16:creationId xmlns:a16="http://schemas.microsoft.com/office/drawing/2014/main" id="{E04A1301-C498-AB89-8F7C-27839371194B}"/>
+              </a:ext>
+            </a:extLst>
+          </p:cNvPr>
+          <p:cNvPicPr>
+            <a:picLocks noChangeAspect="1"/>
+          </p:cNvPicPr>
+          <p:nvPr/>
+        </p:nvPicPr>
+        <p:blipFill>
+          <a:blip r:embed="rId2"/>
+          <a:stretch>
+            <a:fillRect/>
+          </a:stretch>
+        </p:blipFill>
+        <p:spPr>
+          <a:xfrm>
+            <a:off x="126610" y="65866"/>
+            <a:ext cx="5500468" cy="6792134"/>
+          </a:xfrm>
+          <a:prstGeom prst="rect">
+            <a:avLst/>
+          </a:prstGeom>
+        </p:spPr>
+      </p:pic>
+      <p:pic>
+        <p:nvPicPr>
+          <p:cNvPr id="7" name="Picture 6">
+            <a:extLst>
+              <a:ext uri="{FF2B5EF4-FFF2-40B4-BE49-F238E27FC236}">
+                <a16:creationId xmlns:a16="http://schemas.microsoft.com/office/drawing/2014/main" id="{02DD7993-D30F-5BA7-F0A5-1576C8122E36}"/>
+              </a:ext>
+            </a:extLst>
+          </p:cNvPr>
+          <p:cNvPicPr>
+            <a:picLocks noChangeAspect="1"/>
+          </p:cNvPicPr>
+          <p:nvPr/>
+        </p:nvPicPr>
+        <p:blipFill>
+          <a:blip r:embed="rId3"/>
+          <a:stretch>
+            <a:fillRect/>
+          </a:stretch>
+        </p:blipFill>
+        <p:spPr>
+          <a:xfrm>
+            <a:off x="4500253" y="1012873"/>
+            <a:ext cx="7454177" cy="5219113"/>
+          </a:xfrm>
+          <a:prstGeom prst="rect">
+            <a:avLst/>
+          </a:prstGeom>
+        </p:spPr>
+      </p:pic>
+    </p:spTree>
+    <p:extLst>
+      <p:ext uri="{BB962C8B-B14F-4D97-AF65-F5344CB8AC3E}">
+        <p14:creationId xmlns:p14="http://schemas.microsoft.com/office/powerpoint/2010/main" val="308434209"/>
       </p:ext>
     </p:extLst>
   </p:cSld>
@@ -17685,8 +17776,8 @@
           </p:pic>
         </mc:Fallback>
       </mc:AlternateContent>
-      <mc:AlternateContent xmlns:mc="http://schemas.openxmlformats.org/markup-compatibility/2006">
-        <mc:Choice xmlns:p14="http://schemas.microsoft.com/office/powerpoint/2010/main" Requires="p14">
+      <mc:AlternateContent xmlns:mc="http://schemas.openxmlformats.org/markup-compatibility/2006" xmlns:p14="http://schemas.microsoft.com/office/powerpoint/2010/main">
+        <mc:Choice Requires="p14">
           <p:contentPart p14:bwMode="auto" r:id="rId19">
             <p14:nvContentPartPr>
               <p14:cNvPr id="4" name="Ink 3">
@@ -17705,7 +17796,7 @@
             </p14:xfrm>
           </p:contentPart>
         </mc:Choice>
-        <mc:Fallback>
+        <mc:Fallback xmlns="">
           <p:pic>
             <p:nvPicPr>
               <p:cNvPr id="4" name="Ink 3">
@@ -17736,8 +17827,8 @@
           </p:pic>
         </mc:Fallback>
       </mc:AlternateContent>
-      <mc:AlternateContent xmlns:mc="http://schemas.openxmlformats.org/markup-compatibility/2006">
-        <mc:Choice xmlns:p14="http://schemas.microsoft.com/office/powerpoint/2010/main" Requires="p14">
+      <mc:AlternateContent xmlns:mc="http://schemas.openxmlformats.org/markup-compatibility/2006" xmlns:p14="http://schemas.microsoft.com/office/powerpoint/2010/main">
+        <mc:Choice Requires="p14">
           <p:contentPart p14:bwMode="auto" r:id="rId21">
             <p14:nvContentPartPr>
               <p14:cNvPr id="5" name="Ink 4">
@@ -17756,7 +17847,7 @@
             </p14:xfrm>
           </p:contentPart>
         </mc:Choice>
-        <mc:Fallback>
+        <mc:Fallback xmlns="">
           <p:pic>
             <p:nvPicPr>
               <p:cNvPr id="5" name="Ink 4">
@@ -17787,8 +17878,8 @@
           </p:pic>
         </mc:Fallback>
       </mc:AlternateContent>
-      <mc:AlternateContent xmlns:mc="http://schemas.openxmlformats.org/markup-compatibility/2006">
-        <mc:Choice xmlns:p14="http://schemas.microsoft.com/office/powerpoint/2010/main" Requires="p14">
+      <mc:AlternateContent xmlns:mc="http://schemas.openxmlformats.org/markup-compatibility/2006" xmlns:p14="http://schemas.microsoft.com/office/powerpoint/2010/main">
+        <mc:Choice Requires="p14">
           <p:contentPart p14:bwMode="auto" r:id="rId23">
             <p14:nvContentPartPr>
               <p14:cNvPr id="8" name="Ink 7">
@@ -17807,7 +17898,7 @@
             </p14:xfrm>
           </p:contentPart>
         </mc:Choice>
-        <mc:Fallback>
+        <mc:Fallback xmlns="">
           <p:pic>
             <p:nvPicPr>
               <p:cNvPr id="8" name="Ink 7">
@@ -17838,8 +17929,8 @@
           </p:pic>
         </mc:Fallback>
       </mc:AlternateContent>
-      <mc:AlternateContent xmlns:mc="http://schemas.openxmlformats.org/markup-compatibility/2006">
-        <mc:Choice xmlns:p14="http://schemas.microsoft.com/office/powerpoint/2010/main" Requires="p14">
+      <mc:AlternateContent xmlns:mc="http://schemas.openxmlformats.org/markup-compatibility/2006" xmlns:p14="http://schemas.microsoft.com/office/powerpoint/2010/main">
+        <mc:Choice Requires="p14">
           <p:contentPart p14:bwMode="auto" r:id="rId25">
             <p14:nvContentPartPr>
               <p14:cNvPr id="9" name="Ink 8">
@@ -17858,7 +17949,7 @@
             </p14:xfrm>
           </p:contentPart>
         </mc:Choice>
-        <mc:Fallback>
+        <mc:Fallback xmlns="">
           <p:pic>
             <p:nvPicPr>
               <p:cNvPr id="9" name="Ink 8">
@@ -17889,8 +17980,8 @@
           </p:pic>
         </mc:Fallback>
       </mc:AlternateContent>
-      <mc:AlternateContent xmlns:mc="http://schemas.openxmlformats.org/markup-compatibility/2006">
-        <mc:Choice xmlns:p14="http://schemas.microsoft.com/office/powerpoint/2010/main" Requires="p14">
+      <mc:AlternateContent xmlns:mc="http://schemas.openxmlformats.org/markup-compatibility/2006" xmlns:p14="http://schemas.microsoft.com/office/powerpoint/2010/main">
+        <mc:Choice Requires="p14">
           <p:contentPart p14:bwMode="auto" r:id="rId27">
             <p14:nvContentPartPr>
               <p14:cNvPr id="10" name="Ink 9">
@@ -17909,7 +18000,7 @@
             </p14:xfrm>
           </p:contentPart>
         </mc:Choice>
-        <mc:Fallback>
+        <mc:Fallback xmlns="">
           <p:pic>
             <p:nvPicPr>
               <p:cNvPr id="10" name="Ink 9">
@@ -17940,8 +18031,8 @@
           </p:pic>
         </mc:Fallback>
       </mc:AlternateContent>
-      <mc:AlternateContent xmlns:mc="http://schemas.openxmlformats.org/markup-compatibility/2006">
-        <mc:Choice xmlns:p14="http://schemas.microsoft.com/office/powerpoint/2010/main" Requires="p14">
+      <mc:AlternateContent xmlns:mc="http://schemas.openxmlformats.org/markup-compatibility/2006" xmlns:p14="http://schemas.microsoft.com/office/powerpoint/2010/main">
+        <mc:Choice Requires="p14">
           <p:contentPart p14:bwMode="auto" r:id="rId29">
             <p14:nvContentPartPr>
               <p14:cNvPr id="11" name="Ink 10">
@@ -17960,7 +18051,7 @@
             </p14:xfrm>
           </p:contentPart>
         </mc:Choice>
-        <mc:Fallback>
+        <mc:Fallback xmlns="">
           <p:pic>
             <p:nvPicPr>
               <p:cNvPr id="11" name="Ink 10">
@@ -18259,8 +18350,8 @@
           </a:prstGeom>
         </p:spPr>
       </p:pic>
-      <mc:AlternateContent xmlns:mc="http://schemas.openxmlformats.org/markup-compatibility/2006">
-        <mc:Choice xmlns:p14="http://schemas.microsoft.com/office/powerpoint/2010/main" Requires="p14">
+      <mc:AlternateContent xmlns:mc="http://schemas.openxmlformats.org/markup-compatibility/2006" xmlns:p14="http://schemas.microsoft.com/office/powerpoint/2010/main">
+        <mc:Choice Requires="p14">
           <p:contentPart p14:bwMode="auto" r:id="rId6">
             <p14:nvContentPartPr>
               <p14:cNvPr id="3" name="Ink 2">
@@ -18279,7 +18370,7 @@
             </p14:xfrm>
           </p:contentPart>
         </mc:Choice>
-        <mc:Fallback>
+        <mc:Fallback xmlns="">
           <p:pic>
             <p:nvPicPr>
               <p:cNvPr id="3" name="Ink 2">
@@ -18310,8 +18401,8 @@
           </p:pic>
         </mc:Fallback>
       </mc:AlternateContent>
-      <mc:AlternateContent xmlns:mc="http://schemas.openxmlformats.org/markup-compatibility/2006">
-        <mc:Choice xmlns:p14="http://schemas.microsoft.com/office/powerpoint/2010/main" Requires="p14">
+      <mc:AlternateContent xmlns:mc="http://schemas.openxmlformats.org/markup-compatibility/2006" xmlns:p14="http://schemas.microsoft.com/office/powerpoint/2010/main">
+        <mc:Choice Requires="p14">
           <p:contentPart p14:bwMode="auto" r:id="rId8">
             <p14:nvContentPartPr>
               <p14:cNvPr id="4" name="Ink 3">
@@ -18330,7 +18421,7 @@
             </p14:xfrm>
           </p:contentPart>
         </mc:Choice>
-        <mc:Fallback>
+        <mc:Fallback xmlns="">
           <p:pic>
             <p:nvPicPr>
               <p:cNvPr id="4" name="Ink 3">
@@ -18381,8 +18472,8 @@
             <a:chExt cx="3522240" cy="392040"/>
           </a:xfrm>
         </p:grpSpPr>
-        <mc:AlternateContent xmlns:mc="http://schemas.openxmlformats.org/markup-compatibility/2006">
-          <mc:Choice xmlns:p14="http://schemas.microsoft.com/office/powerpoint/2010/main" Requires="p14">
+        <mc:AlternateContent xmlns:mc="http://schemas.openxmlformats.org/markup-compatibility/2006" xmlns:p14="http://schemas.microsoft.com/office/powerpoint/2010/main">
+          <mc:Choice Requires="p14">
             <p:contentPart p14:bwMode="auto" r:id="rId10">
               <p14:nvContentPartPr>
                 <p14:cNvPr id="5" name="Ink 4">
@@ -18401,7 +18492,7 @@
               </p14:xfrm>
             </p:contentPart>
           </mc:Choice>
-          <mc:Fallback>
+          <mc:Fallback xmlns="">
             <p:pic>
               <p:nvPicPr>
                 <p:cNvPr id="5" name="Ink 4">
@@ -18432,8 +18523,8 @@
             </p:pic>
           </mc:Fallback>
         </mc:AlternateContent>
-        <mc:AlternateContent xmlns:mc="http://schemas.openxmlformats.org/markup-compatibility/2006">
-          <mc:Choice xmlns:p14="http://schemas.microsoft.com/office/powerpoint/2010/main" Requires="p14">
+        <mc:AlternateContent xmlns:mc="http://schemas.openxmlformats.org/markup-compatibility/2006" xmlns:p14="http://schemas.microsoft.com/office/powerpoint/2010/main">
+          <mc:Choice Requires="p14">
             <p:contentPart p14:bwMode="auto" r:id="rId12">
               <p14:nvContentPartPr>
                 <p14:cNvPr id="6" name="Ink 5">
@@ -18452,7 +18543,7 @@
               </p14:xfrm>
             </p:contentPart>
           </mc:Choice>
-          <mc:Fallback>
+          <mc:Fallback xmlns="">
             <p:pic>
               <p:nvPicPr>
                 <p:cNvPr id="6" name="Ink 5">
@@ -19970,8 +20061,8 @@
             <a:chExt cx="2734560" cy="528120"/>
           </a:xfrm>
         </p:grpSpPr>
-        <mc:AlternateContent xmlns:mc="http://schemas.openxmlformats.org/markup-compatibility/2006">
-          <mc:Choice xmlns:p14="http://schemas.microsoft.com/office/powerpoint/2010/main" Requires="p14">
+        <mc:AlternateContent xmlns:mc="http://schemas.openxmlformats.org/markup-compatibility/2006" xmlns:p14="http://schemas.microsoft.com/office/powerpoint/2010/main">
+          <mc:Choice Requires="p14">
             <p:contentPart p14:bwMode="auto" r:id="rId5">
               <p14:nvContentPartPr>
                 <p14:cNvPr id="2" name="Ink 1">
@@ -19990,7 +20081,7 @@
               </p14:xfrm>
             </p:contentPart>
           </mc:Choice>
-          <mc:Fallback>
+          <mc:Fallback xmlns="">
             <p:pic>
               <p:nvPicPr>
                 <p:cNvPr id="2" name="Ink 1">
@@ -20021,8 +20112,8 @@
             </p:pic>
           </mc:Fallback>
         </mc:AlternateContent>
-        <mc:AlternateContent xmlns:mc="http://schemas.openxmlformats.org/markup-compatibility/2006">
-          <mc:Choice xmlns:p14="http://schemas.microsoft.com/office/powerpoint/2010/main" Requires="p14">
+        <mc:AlternateContent xmlns:mc="http://schemas.openxmlformats.org/markup-compatibility/2006" xmlns:p14="http://schemas.microsoft.com/office/powerpoint/2010/main">
+          <mc:Choice Requires="p14">
             <p:contentPart p14:bwMode="auto" r:id="rId7">
               <p14:nvContentPartPr>
                 <p14:cNvPr id="3" name="Ink 2">
@@ -20041,7 +20132,7 @@
               </p14:xfrm>
             </p:contentPart>
           </mc:Choice>
-          <mc:Fallback>
+          <mc:Fallback xmlns="">
             <p:pic>
               <p:nvPicPr>
                 <p:cNvPr id="3" name="Ink 2">
@@ -20072,8 +20163,8 @@
             </p:pic>
           </mc:Fallback>
         </mc:AlternateContent>
-        <mc:AlternateContent xmlns:mc="http://schemas.openxmlformats.org/markup-compatibility/2006">
-          <mc:Choice xmlns:p14="http://schemas.microsoft.com/office/powerpoint/2010/main" Requires="p14">
+        <mc:AlternateContent xmlns:mc="http://schemas.openxmlformats.org/markup-compatibility/2006" xmlns:p14="http://schemas.microsoft.com/office/powerpoint/2010/main">
+          <mc:Choice Requires="p14">
             <p:contentPart p14:bwMode="auto" r:id="rId9">
               <p14:nvContentPartPr>
                 <p14:cNvPr id="4" name="Ink 3">
@@ -20092,7 +20183,7 @@
               </p14:xfrm>
             </p:contentPart>
           </mc:Choice>
-          <mc:Fallback>
+          <mc:Fallback xmlns="">
             <p:pic>
               <p:nvPicPr>
                 <p:cNvPr id="4" name="Ink 3">
@@ -20123,8 +20214,8 @@
             </p:pic>
           </mc:Fallback>
         </mc:AlternateContent>
-        <mc:AlternateContent xmlns:mc="http://schemas.openxmlformats.org/markup-compatibility/2006">
-          <mc:Choice xmlns:p14="http://schemas.microsoft.com/office/powerpoint/2010/main" Requires="p14">
+        <mc:AlternateContent xmlns:mc="http://schemas.openxmlformats.org/markup-compatibility/2006" xmlns:p14="http://schemas.microsoft.com/office/powerpoint/2010/main">
+          <mc:Choice Requires="p14">
             <p:contentPart p14:bwMode="auto" r:id="rId11">
               <p14:nvContentPartPr>
                 <p14:cNvPr id="5" name="Ink 4">
@@ -20143,7 +20234,7 @@
               </p14:xfrm>
             </p:contentPart>
           </mc:Choice>
-          <mc:Fallback>
+          <mc:Fallback xmlns="">
             <p:pic>
               <p:nvPicPr>
                 <p:cNvPr id="5" name="Ink 4">
@@ -20174,8 +20265,8 @@
             </p:pic>
           </mc:Fallback>
         </mc:AlternateContent>
-        <mc:AlternateContent xmlns:mc="http://schemas.openxmlformats.org/markup-compatibility/2006">
-          <mc:Choice xmlns:p14="http://schemas.microsoft.com/office/powerpoint/2010/main" Requires="p14">
+        <mc:AlternateContent xmlns:mc="http://schemas.openxmlformats.org/markup-compatibility/2006" xmlns:p14="http://schemas.microsoft.com/office/powerpoint/2010/main">
+          <mc:Choice Requires="p14">
             <p:contentPart p14:bwMode="auto" r:id="rId13">
               <p14:nvContentPartPr>
                 <p14:cNvPr id="7" name="Ink 6">
@@ -20194,7 +20285,7 @@
               </p14:xfrm>
             </p:contentPart>
           </mc:Choice>
-          <mc:Fallback>
+          <mc:Fallback xmlns="">
             <p:pic>
               <p:nvPicPr>
                 <p:cNvPr id="7" name="Ink 6">
@@ -20225,8 +20316,8 @@
             </p:pic>
           </mc:Fallback>
         </mc:AlternateContent>
-        <mc:AlternateContent xmlns:mc="http://schemas.openxmlformats.org/markup-compatibility/2006">
-          <mc:Choice xmlns:p14="http://schemas.microsoft.com/office/powerpoint/2010/main" Requires="p14">
+        <mc:AlternateContent xmlns:mc="http://schemas.openxmlformats.org/markup-compatibility/2006" xmlns:p14="http://schemas.microsoft.com/office/powerpoint/2010/main">
+          <mc:Choice Requires="p14">
             <p:contentPart p14:bwMode="auto" r:id="rId15">
               <p14:nvContentPartPr>
                 <p14:cNvPr id="8" name="Ink 7">
@@ -20245,7 +20336,7 @@
               </p14:xfrm>
             </p:contentPart>
           </mc:Choice>
-          <mc:Fallback>
+          <mc:Fallback xmlns="">
             <p:pic>
               <p:nvPicPr>
                 <p:cNvPr id="8" name="Ink 7">
@@ -20276,8 +20367,8 @@
             </p:pic>
           </mc:Fallback>
         </mc:AlternateContent>
-        <mc:AlternateContent xmlns:mc="http://schemas.openxmlformats.org/markup-compatibility/2006">
-          <mc:Choice xmlns:p14="http://schemas.microsoft.com/office/powerpoint/2010/main" Requires="p14">
+        <mc:AlternateContent xmlns:mc="http://schemas.openxmlformats.org/markup-compatibility/2006" xmlns:p14="http://schemas.microsoft.com/office/powerpoint/2010/main">
+          <mc:Choice Requires="p14">
             <p:contentPart p14:bwMode="auto" r:id="rId17">
               <p14:nvContentPartPr>
                 <p14:cNvPr id="9" name="Ink 8">
@@ -20296,7 +20387,7 @@
               </p14:xfrm>
             </p:contentPart>
           </mc:Choice>
-          <mc:Fallback>
+          <mc:Fallback xmlns="">
             <p:pic>
               <p:nvPicPr>
                 <p:cNvPr id="9" name="Ink 8">
@@ -20327,8 +20418,8 @@
             </p:pic>
           </mc:Fallback>
         </mc:AlternateContent>
-        <mc:AlternateContent xmlns:mc="http://schemas.openxmlformats.org/markup-compatibility/2006">
-          <mc:Choice xmlns:p14="http://schemas.microsoft.com/office/powerpoint/2010/main" Requires="p14">
+        <mc:AlternateContent xmlns:mc="http://schemas.openxmlformats.org/markup-compatibility/2006" xmlns:p14="http://schemas.microsoft.com/office/powerpoint/2010/main">
+          <mc:Choice Requires="p14">
             <p:contentPart p14:bwMode="auto" r:id="rId19">
               <p14:nvContentPartPr>
                 <p14:cNvPr id="10" name="Ink 9">
@@ -20347,7 +20438,7 @@
               </p14:xfrm>
             </p:contentPart>
           </mc:Choice>
-          <mc:Fallback>
+          <mc:Fallback xmlns="">
             <p:pic>
               <p:nvPicPr>
                 <p:cNvPr id="10" name="Ink 9">
@@ -20378,8 +20469,8 @@
             </p:pic>
           </mc:Fallback>
         </mc:AlternateContent>
-        <mc:AlternateContent xmlns:mc="http://schemas.openxmlformats.org/markup-compatibility/2006">
-          <mc:Choice xmlns:p14="http://schemas.microsoft.com/office/powerpoint/2010/main" Requires="p14">
+        <mc:AlternateContent xmlns:mc="http://schemas.openxmlformats.org/markup-compatibility/2006" xmlns:p14="http://schemas.microsoft.com/office/powerpoint/2010/main">
+          <mc:Choice Requires="p14">
             <p:contentPart p14:bwMode="auto" r:id="rId21">
               <p14:nvContentPartPr>
                 <p14:cNvPr id="12" name="Ink 11">
@@ -20398,7 +20489,7 @@
               </p14:xfrm>
             </p:contentPart>
           </mc:Choice>
-          <mc:Fallback>
+          <mc:Fallback xmlns="">
             <p:pic>
               <p:nvPicPr>
                 <p:cNvPr id="12" name="Ink 11">
@@ -20429,8 +20520,8 @@
             </p:pic>
           </mc:Fallback>
         </mc:AlternateContent>
-        <mc:AlternateContent xmlns:mc="http://schemas.openxmlformats.org/markup-compatibility/2006">
-          <mc:Choice xmlns:p14="http://schemas.microsoft.com/office/powerpoint/2010/main" Requires="p14">
+        <mc:AlternateContent xmlns:mc="http://schemas.openxmlformats.org/markup-compatibility/2006" xmlns:p14="http://schemas.microsoft.com/office/powerpoint/2010/main">
+          <mc:Choice Requires="p14">
             <p:contentPart p14:bwMode="auto" r:id="rId23">
               <p14:nvContentPartPr>
                 <p14:cNvPr id="13" name="Ink 12">
@@ -20449,7 +20540,7 @@
               </p14:xfrm>
             </p:contentPart>
           </mc:Choice>
-          <mc:Fallback>
+          <mc:Fallback xmlns="">
             <p:pic>
               <p:nvPicPr>
                 <p:cNvPr id="13" name="Ink 12">
@@ -20480,8 +20571,8 @@
             </p:pic>
           </mc:Fallback>
         </mc:AlternateContent>
-        <mc:AlternateContent xmlns:mc="http://schemas.openxmlformats.org/markup-compatibility/2006">
-          <mc:Choice xmlns:p14="http://schemas.microsoft.com/office/powerpoint/2010/main" Requires="p14">
+        <mc:AlternateContent xmlns:mc="http://schemas.openxmlformats.org/markup-compatibility/2006" xmlns:p14="http://schemas.microsoft.com/office/powerpoint/2010/main">
+          <mc:Choice Requires="p14">
             <p:contentPart p14:bwMode="auto" r:id="rId25">
               <p14:nvContentPartPr>
                 <p14:cNvPr id="14" name="Ink 13">
@@ -20500,7 +20591,7 @@
               </p14:xfrm>
             </p:contentPart>
           </mc:Choice>
-          <mc:Fallback>
+          <mc:Fallback xmlns="">
             <p:pic>
               <p:nvPicPr>
                 <p:cNvPr id="14" name="Ink 13">
@@ -20531,8 +20622,8 @@
             </p:pic>
           </mc:Fallback>
         </mc:AlternateContent>
-        <mc:AlternateContent xmlns:mc="http://schemas.openxmlformats.org/markup-compatibility/2006">
-          <mc:Choice xmlns:p14="http://schemas.microsoft.com/office/powerpoint/2010/main" Requires="p14">
+        <mc:AlternateContent xmlns:mc="http://schemas.openxmlformats.org/markup-compatibility/2006" xmlns:p14="http://schemas.microsoft.com/office/powerpoint/2010/main">
+          <mc:Choice Requires="p14">
             <p:contentPart p14:bwMode="auto" r:id="rId27">
               <p14:nvContentPartPr>
                 <p14:cNvPr id="15" name="Ink 14">
@@ -20551,7 +20642,7 @@
               </p14:xfrm>
             </p:contentPart>
           </mc:Choice>
-          <mc:Fallback>
+          <mc:Fallback xmlns="">
             <p:pic>
               <p:nvPicPr>
                 <p:cNvPr id="15" name="Ink 14">
@@ -20582,8 +20673,8 @@
             </p:pic>
           </mc:Fallback>
         </mc:AlternateContent>
-        <mc:AlternateContent xmlns:mc="http://schemas.openxmlformats.org/markup-compatibility/2006">
-          <mc:Choice xmlns:p14="http://schemas.microsoft.com/office/powerpoint/2010/main" Requires="p14">
+        <mc:AlternateContent xmlns:mc="http://schemas.openxmlformats.org/markup-compatibility/2006" xmlns:p14="http://schemas.microsoft.com/office/powerpoint/2010/main">
+          <mc:Choice Requires="p14">
             <p:contentPart p14:bwMode="auto" r:id="rId29">
               <p14:nvContentPartPr>
                 <p14:cNvPr id="17" name="Ink 16">
@@ -20602,7 +20693,7 @@
               </p14:xfrm>
             </p:contentPart>
           </mc:Choice>
-          <mc:Fallback>
+          <mc:Fallback xmlns="">
             <p:pic>
               <p:nvPicPr>
                 <p:cNvPr id="17" name="Ink 16">
@@ -20633,8 +20724,8 @@
             </p:pic>
           </mc:Fallback>
         </mc:AlternateContent>
-        <mc:AlternateContent xmlns:mc="http://schemas.openxmlformats.org/markup-compatibility/2006">
-          <mc:Choice xmlns:p14="http://schemas.microsoft.com/office/powerpoint/2010/main" Requires="p14">
+        <mc:AlternateContent xmlns:mc="http://schemas.openxmlformats.org/markup-compatibility/2006" xmlns:p14="http://schemas.microsoft.com/office/powerpoint/2010/main">
+          <mc:Choice Requires="p14">
             <p:contentPart p14:bwMode="auto" r:id="rId31">
               <p14:nvContentPartPr>
                 <p14:cNvPr id="19" name="Ink 18">
@@ -20653,7 +20744,7 @@
               </p14:xfrm>
             </p:contentPart>
           </mc:Choice>
-          <mc:Fallback>
+          <mc:Fallback xmlns="">
             <p:pic>
               <p:nvPicPr>
                 <p:cNvPr id="19" name="Ink 18">
@@ -20684,8 +20775,8 @@
             </p:pic>
           </mc:Fallback>
         </mc:AlternateContent>
-        <mc:AlternateContent xmlns:mc="http://schemas.openxmlformats.org/markup-compatibility/2006">
-          <mc:Choice xmlns:p14="http://schemas.microsoft.com/office/powerpoint/2010/main" Requires="p14">
+        <mc:AlternateContent xmlns:mc="http://schemas.openxmlformats.org/markup-compatibility/2006" xmlns:p14="http://schemas.microsoft.com/office/powerpoint/2010/main">
+          <mc:Choice Requires="p14">
             <p:contentPart p14:bwMode="auto" r:id="rId33">
               <p14:nvContentPartPr>
                 <p14:cNvPr id="22" name="Ink 21">
@@ -20704,7 +20795,7 @@
               </p14:xfrm>
             </p:contentPart>
           </mc:Choice>
-          <mc:Fallback>
+          <mc:Fallback xmlns="">
             <p:pic>
               <p:nvPicPr>
                 <p:cNvPr id="22" name="Ink 21">
@@ -20735,8 +20826,8 @@
             </p:pic>
           </mc:Fallback>
         </mc:AlternateContent>
-        <mc:AlternateContent xmlns:mc="http://schemas.openxmlformats.org/markup-compatibility/2006">
-          <mc:Choice xmlns:p14="http://schemas.microsoft.com/office/powerpoint/2010/main" Requires="p14">
+        <mc:AlternateContent xmlns:mc="http://schemas.openxmlformats.org/markup-compatibility/2006" xmlns:p14="http://schemas.microsoft.com/office/powerpoint/2010/main">
+          <mc:Choice Requires="p14">
             <p:contentPart p14:bwMode="auto" r:id="rId35">
               <p14:nvContentPartPr>
                 <p14:cNvPr id="23" name="Ink 22">
@@ -20755,7 +20846,7 @@
               </p14:xfrm>
             </p:contentPart>
           </mc:Choice>
-          <mc:Fallback>
+          <mc:Fallback xmlns="">
             <p:pic>
               <p:nvPicPr>
                 <p:cNvPr id="23" name="Ink 22">
@@ -20786,8 +20877,8 @@
             </p:pic>
           </mc:Fallback>
         </mc:AlternateContent>
-        <mc:AlternateContent xmlns:mc="http://schemas.openxmlformats.org/markup-compatibility/2006">
-          <mc:Choice xmlns:p14="http://schemas.microsoft.com/office/powerpoint/2010/main" Requires="p14">
+        <mc:AlternateContent xmlns:mc="http://schemas.openxmlformats.org/markup-compatibility/2006" xmlns:p14="http://schemas.microsoft.com/office/powerpoint/2010/main">
+          <mc:Choice Requires="p14">
             <p:contentPart p14:bwMode="auto" r:id="rId37">
               <p14:nvContentPartPr>
                 <p14:cNvPr id="24" name="Ink 23">
@@ -20806,7 +20897,7 @@
               </p14:xfrm>
             </p:contentPart>
           </mc:Choice>
-          <mc:Fallback>
+          <mc:Fallback xmlns="">
             <p:pic>
               <p:nvPicPr>
                 <p:cNvPr id="24" name="Ink 23">
@@ -20837,8 +20928,8 @@
             </p:pic>
           </mc:Fallback>
         </mc:AlternateContent>
-        <mc:AlternateContent xmlns:mc="http://schemas.openxmlformats.org/markup-compatibility/2006">
-          <mc:Choice xmlns:p14="http://schemas.microsoft.com/office/powerpoint/2010/main" Requires="p14">
+        <mc:AlternateContent xmlns:mc="http://schemas.openxmlformats.org/markup-compatibility/2006" xmlns:p14="http://schemas.microsoft.com/office/powerpoint/2010/main">
+          <mc:Choice Requires="p14">
             <p:contentPart p14:bwMode="auto" r:id="rId39">
               <p14:nvContentPartPr>
                 <p14:cNvPr id="25" name="Ink 24">
@@ -20857,7 +20948,7 @@
               </p14:xfrm>
             </p:contentPart>
           </mc:Choice>
-          <mc:Fallback>
+          <mc:Fallback xmlns="">
             <p:pic>
               <p:nvPicPr>
                 <p:cNvPr id="25" name="Ink 24">
@@ -20888,8 +20979,8 @@
             </p:pic>
           </mc:Fallback>
         </mc:AlternateContent>
-        <mc:AlternateContent xmlns:mc="http://schemas.openxmlformats.org/markup-compatibility/2006">
-          <mc:Choice xmlns:p14="http://schemas.microsoft.com/office/powerpoint/2010/main" Requires="p14">
+        <mc:AlternateContent xmlns:mc="http://schemas.openxmlformats.org/markup-compatibility/2006" xmlns:p14="http://schemas.microsoft.com/office/powerpoint/2010/main">
+          <mc:Choice Requires="p14">
             <p:contentPart p14:bwMode="auto" r:id="rId41">
               <p14:nvContentPartPr>
                 <p14:cNvPr id="26" name="Ink 25">
@@ -20908,7 +20999,7 @@
               </p14:xfrm>
             </p:contentPart>
           </mc:Choice>
-          <mc:Fallback>
+          <mc:Fallback xmlns="">
             <p:pic>
               <p:nvPicPr>
                 <p:cNvPr id="26" name="Ink 25">

</xml_diff>